<commit_message>
added how to and cheat sheet
</commit_message>
<xml_diff>
--- a/Project vs. Product A5.pptx
+++ b/Project vs. Product A5.pptx
@@ -7,47 +7,55 @@
     <p:sldMasterId id="2147483733" r:id="rId3"/>
   </p:sldMasterIdLst>
   <p:notesMasterIdLst>
-    <p:notesMasterId r:id="rId42"/>
+    <p:notesMasterId r:id="rId50"/>
   </p:notesMasterIdLst>
   <p:sldIdLst>
     <p:sldId id="256" r:id="rId4"/>
     <p:sldId id="257" r:id="rId5"/>
-    <p:sldId id="258" r:id="rId6"/>
-    <p:sldId id="261" r:id="rId7"/>
-    <p:sldId id="260" r:id="rId8"/>
-    <p:sldId id="259" r:id="rId9"/>
-    <p:sldId id="262" r:id="rId10"/>
-    <p:sldId id="263" r:id="rId11"/>
-    <p:sldId id="264" r:id="rId12"/>
-    <p:sldId id="265" r:id="rId13"/>
-    <p:sldId id="266" r:id="rId14"/>
-    <p:sldId id="267" r:id="rId15"/>
-    <p:sldId id="268" r:id="rId16"/>
-    <p:sldId id="269" r:id="rId17"/>
-    <p:sldId id="270" r:id="rId18"/>
-    <p:sldId id="271" r:id="rId19"/>
-    <p:sldId id="272" r:id="rId20"/>
-    <p:sldId id="273" r:id="rId21"/>
-    <p:sldId id="278" r:id="rId22"/>
-    <p:sldId id="275" r:id="rId23"/>
-    <p:sldId id="279" r:id="rId24"/>
-    <p:sldId id="277" r:id="rId25"/>
-    <p:sldId id="280" r:id="rId26"/>
-    <p:sldId id="281" r:id="rId27"/>
-    <p:sldId id="282" r:id="rId28"/>
-    <p:sldId id="283" r:id="rId29"/>
-    <p:sldId id="284" r:id="rId30"/>
-    <p:sldId id="285" r:id="rId31"/>
-    <p:sldId id="286" r:id="rId32"/>
-    <p:sldId id="287" r:id="rId33"/>
-    <p:sldId id="288" r:id="rId34"/>
-    <p:sldId id="289" r:id="rId35"/>
-    <p:sldId id="290" r:id="rId36"/>
-    <p:sldId id="291" r:id="rId37"/>
-    <p:sldId id="292" r:id="rId38"/>
-    <p:sldId id="293" r:id="rId39"/>
-    <p:sldId id="294" r:id="rId40"/>
-    <p:sldId id="295" r:id="rId41"/>
+    <p:sldId id="299" r:id="rId6"/>
+    <p:sldId id="298" r:id="rId7"/>
+    <p:sldId id="300" r:id="rId8"/>
+    <p:sldId id="301" r:id="rId9"/>
+    <p:sldId id="258" r:id="rId10"/>
+    <p:sldId id="261" r:id="rId11"/>
+    <p:sldId id="260" r:id="rId12"/>
+    <p:sldId id="259" r:id="rId13"/>
+    <p:sldId id="262" r:id="rId14"/>
+    <p:sldId id="263" r:id="rId15"/>
+    <p:sldId id="264" r:id="rId16"/>
+    <p:sldId id="265" r:id="rId17"/>
+    <p:sldId id="266" r:id="rId18"/>
+    <p:sldId id="267" r:id="rId19"/>
+    <p:sldId id="268" r:id="rId20"/>
+    <p:sldId id="269" r:id="rId21"/>
+    <p:sldId id="270" r:id="rId22"/>
+    <p:sldId id="271" r:id="rId23"/>
+    <p:sldId id="296" r:id="rId24"/>
+    <p:sldId id="297" r:id="rId25"/>
+    <p:sldId id="272" r:id="rId26"/>
+    <p:sldId id="273" r:id="rId27"/>
+    <p:sldId id="278" r:id="rId28"/>
+    <p:sldId id="275" r:id="rId29"/>
+    <p:sldId id="279" r:id="rId30"/>
+    <p:sldId id="277" r:id="rId31"/>
+    <p:sldId id="302" r:id="rId32"/>
+    <p:sldId id="303" r:id="rId33"/>
+    <p:sldId id="280" r:id="rId34"/>
+    <p:sldId id="281" r:id="rId35"/>
+    <p:sldId id="282" r:id="rId36"/>
+    <p:sldId id="283" r:id="rId37"/>
+    <p:sldId id="284" r:id="rId38"/>
+    <p:sldId id="285" r:id="rId39"/>
+    <p:sldId id="286" r:id="rId40"/>
+    <p:sldId id="287" r:id="rId41"/>
+    <p:sldId id="288" r:id="rId42"/>
+    <p:sldId id="289" r:id="rId43"/>
+    <p:sldId id="290" r:id="rId44"/>
+    <p:sldId id="291" r:id="rId45"/>
+    <p:sldId id="292" r:id="rId46"/>
+    <p:sldId id="293" r:id="rId47"/>
+    <p:sldId id="294" r:id="rId48"/>
+    <p:sldId id="295" r:id="rId49"/>
   </p:sldIdLst>
   <p:sldSz cx="7775575" cy="5543550"/>
   <p:notesSz cx="9144000" cy="6858000"/>
@@ -236,7 +244,7 @@
           <a:p>
             <a:fld id="{0FCCFF5F-ECA6-4C43-9705-01C954A54664}" type="datetimeFigureOut">
               <a:rPr lang="nl-NL" smtClean="0"/>
-              <a:t>13-02-2023</a:t>
+              <a:t>14-2-2023</a:t>
             </a:fld>
             <a:endParaRPr lang="nl-NL"/>
           </a:p>
@@ -7434,7 +7442,7 @@
 </file>
 
 <file path=ppt/slideLayouts/slideLayout17.xml><?xml version="1.0" encoding="utf-8"?>
-<p:sldLayout xmlns:a="http://schemas.openxmlformats.org/drawingml/2006/main" xmlns:r="http://schemas.openxmlformats.org/officeDocument/2006/relationships" xmlns:p="http://schemas.openxmlformats.org/presentationml/2006/main" preserve="1">
+<p:sldLayout xmlns:a="http://schemas.openxmlformats.org/drawingml/2006/main" xmlns:r="http://schemas.openxmlformats.org/officeDocument/2006/relationships" xmlns:p="http://schemas.openxmlformats.org/presentationml/2006/main" preserve="1" userDrawn="1">
   <p:cSld name="Facilitation instructions">
     <p:spTree>
       <p:nvGrpSpPr>
@@ -7581,36 +7589,6 @@
           </a:p>
         </p:txBody>
       </p:sp>
-      <p:pic>
-        <p:nvPicPr>
-          <p:cNvPr id="6" name="Picture 5">
-            <a:extLst>
-              <a:ext uri="{FF2B5EF4-FFF2-40B4-BE49-F238E27FC236}">
-                <a16:creationId xmlns:a16="http://schemas.microsoft.com/office/drawing/2014/main" id="{D5E571BB-20EF-EA90-9C4F-5544C7572539}"/>
-              </a:ext>
-            </a:extLst>
-          </p:cNvPr>
-          <p:cNvPicPr>
-            <a:picLocks noChangeAspect="1"/>
-          </p:cNvPicPr>
-          <p:nvPr/>
-        </p:nvPicPr>
-        <p:blipFill>
-          <a:blip r:embed="rId2"/>
-          <a:stretch>
-            <a:fillRect/>
-          </a:stretch>
-        </p:blipFill>
-        <p:spPr>
-          <a:xfrm>
-            <a:off x="4896817" y="4001212"/>
-            <a:ext cx="1894331" cy="784451"/>
-          </a:xfrm>
-          <a:prstGeom prst="rect">
-            <a:avLst/>
-          </a:prstGeom>
-        </p:spPr>
-      </p:pic>
       <p:sp>
         <p:nvSpPr>
           <p:cNvPr id="8" name="Text Placeholder 7">
@@ -7703,116 +7681,6 @@
               <a:rPr lang="en-GB" dirty="0"/>
               <a:t>With Optional sub-steps</a:t>
             </a:r>
-          </a:p>
-        </p:txBody>
-      </p:sp>
-      <p:sp>
-        <p:nvSpPr>
-          <p:cNvPr id="11" name="Text Placeholder 10">
-            <a:extLst>
-              <a:ext uri="{FF2B5EF4-FFF2-40B4-BE49-F238E27FC236}">
-                <a16:creationId xmlns:a16="http://schemas.microsoft.com/office/drawing/2014/main" id="{38829CF1-2A09-9433-F183-49CB8CD2899A}"/>
-              </a:ext>
-            </a:extLst>
-          </p:cNvPr>
-          <p:cNvSpPr>
-            <a:spLocks noGrp="1"/>
-          </p:cNvSpPr>
-          <p:nvPr>
-            <p:ph type="body" sz="quarter" idx="12" hasCustomPrompt="1"/>
-          </p:nvPr>
-        </p:nvSpPr>
-        <p:spPr>
-          <a:xfrm>
-            <a:off x="4144120" y="4711193"/>
-            <a:ext cx="3323480" cy="396875"/>
-          </a:xfrm>
-          <a:prstGeom prst="rect">
-            <a:avLst/>
-          </a:prstGeom>
-        </p:spPr>
-        <p:txBody>
-          <a:bodyPr anchor="ctr"/>
-          <a:lstStyle>
-            <a:lvl1pPr marL="0" indent="0" algn="ctr">
-              <a:buNone/>
-              <a:defRPr sz="800">
-                <a:solidFill>
-                  <a:schemeClr val="bg1">
-                    <a:lumMod val="75000"/>
-                  </a:schemeClr>
-                </a:solidFill>
-                <a:latin typeface="Ubuntu" panose="020B0504030602030204" pitchFamily="34" charset="0"/>
-              </a:defRPr>
-            </a:lvl1pPr>
-            <a:lvl2pPr marL="457200" indent="0" algn="ctr">
-              <a:buNone/>
-              <a:defRPr sz="800">
-                <a:solidFill>
-                  <a:schemeClr val="bg2">
-                    <a:lumMod val="75000"/>
-                  </a:schemeClr>
-                </a:solidFill>
-                <a:latin typeface="Ubuntu" panose="020B0504030602030204" pitchFamily="34" charset="0"/>
-              </a:defRPr>
-            </a:lvl2pPr>
-            <a:lvl3pPr marL="914400" indent="0" algn="ctr">
-              <a:buNone/>
-              <a:defRPr sz="800">
-                <a:solidFill>
-                  <a:schemeClr val="bg2">
-                    <a:lumMod val="75000"/>
-                  </a:schemeClr>
-                </a:solidFill>
-                <a:latin typeface="Ubuntu" panose="020B0504030602030204" pitchFamily="34" charset="0"/>
-              </a:defRPr>
-            </a:lvl3pPr>
-            <a:lvl4pPr marL="1371600" indent="0" algn="ctr">
-              <a:buNone/>
-              <a:defRPr sz="800">
-                <a:solidFill>
-                  <a:schemeClr val="bg2">
-                    <a:lumMod val="75000"/>
-                  </a:schemeClr>
-                </a:solidFill>
-                <a:latin typeface="Ubuntu" panose="020B0504030602030204" pitchFamily="34" charset="0"/>
-              </a:defRPr>
-            </a:lvl4pPr>
-            <a:lvl5pPr marL="1828800" indent="0" algn="ctr">
-              <a:buNone/>
-              <a:defRPr sz="800">
-                <a:solidFill>
-                  <a:schemeClr val="bg2">
-                    <a:lumMod val="75000"/>
-                  </a:schemeClr>
-                </a:solidFill>
-                <a:latin typeface="Ubuntu" panose="020B0504030602030204" pitchFamily="34" charset="0"/>
-              </a:defRPr>
-            </a:lvl5pPr>
-          </a:lstStyle>
-          <a:p>
-            <a:pPr lvl="0"/>
-            <a:r>
-              <a:rPr lang="en-GB" dirty="0"/>
-              <a:t>License: </a:t>
-            </a:r>
-            <a:r>
-              <a:rPr lang="en-GB" dirty="0" err="1"/>
-              <a:t>ie</a:t>
-            </a:r>
-            <a:r>
-              <a:rPr lang="en-GB" dirty="0"/>
-              <a:t> All rights reserved </a:t>
-            </a:r>
-            <a:r>
-              <a:rPr lang="en-GB" dirty="0" err="1"/>
-              <a:t>Scrum.org</a:t>
-            </a:r>
-            <a:r>
-              <a:rPr lang="en-GB" dirty="0"/>
-              <a:t> OR Creative Commons OR original concept by ACME INC, etc.:</a:t>
-            </a:r>
-            <a:endParaRPr lang="en-NL" dirty="0"/>
           </a:p>
         </p:txBody>
       </p:sp>
@@ -8015,7 +7883,7 @@
           <a:p>
             <a:r>
               <a:rPr lang="en-GB"/>
-              <a:t>V 1.0</a:t>
+              <a:t>1.1</a:t>
             </a:r>
             <a:endParaRPr lang="en-NL" dirty="0"/>
           </a:p>
@@ -9885,7 +9753,7 @@
           <a:p>
             <a:r>
               <a:rPr lang="en-GB"/>
-              <a:t>V 1.0</a:t>
+              <a:t>1.1</a:t>
             </a:r>
             <a:endParaRPr lang="en-NL"/>
           </a:p>
@@ -10310,7 +10178,7 @@
           <a:p>
             <a:r>
               <a:rPr lang="en-GB"/>
-              <a:t>V 1.0</a:t>
+              <a:t>1.1</a:t>
             </a:r>
             <a:endParaRPr lang="en-NL"/>
           </a:p>
@@ -10517,7 +10385,7 @@
           <a:p>
             <a:r>
               <a:rPr lang="en-GB"/>
-              <a:t>V 1.0</a:t>
+              <a:t>1.1</a:t>
             </a:r>
             <a:endParaRPr lang="en-NL"/>
           </a:p>
@@ -14188,7 +14056,7 @@
           <a:p>
             <a:r>
               <a:rPr lang="en-GB"/>
-              <a:t>V 1.0</a:t>
+              <a:t>1.1</a:t>
             </a:r>
             <a:endParaRPr lang="en-NL" dirty="0"/>
           </a:p>
@@ -15406,6 +15274,241 @@
           <p:cNvPr id="2" name="Tijdelijke aanduiding voor voettekst 1">
             <a:extLst>
               <a:ext uri="{FF2B5EF4-FFF2-40B4-BE49-F238E27FC236}">
+                <a16:creationId xmlns:a16="http://schemas.microsoft.com/office/drawing/2014/main" id="{4B9B72EC-C051-29B0-F054-01E34038788F}"/>
+              </a:ext>
+            </a:extLst>
+          </p:cNvPr>
+          <p:cNvSpPr>
+            <a:spLocks noGrp="1"/>
+          </p:cNvSpPr>
+          <p:nvPr>
+            <p:ph type="ftr" sz="quarter" idx="11"/>
+          </p:nvPr>
+        </p:nvSpPr>
+        <p:spPr/>
+        <p:txBody>
+          <a:bodyPr/>
+          <a:lstStyle/>
+          <a:p>
+            <a:r>
+              <a:rPr lang="en-GB"/>
+              <a:t>1.1</a:t>
+            </a:r>
+            <a:endParaRPr lang="en-NL"/>
+          </a:p>
+        </p:txBody>
+      </p:sp>
+    </p:spTree>
+    <p:extLst>
+      <p:ext uri="{BB962C8B-B14F-4D97-AF65-F5344CB8AC3E}">
+        <p14:creationId xmlns:p14="http://schemas.microsoft.com/office/powerpoint/2010/main" val="922097976"/>
+      </p:ext>
+    </p:extLst>
+  </p:cSld>
+  <p:clrMapOvr>
+    <a:masterClrMapping/>
+  </p:clrMapOvr>
+</p:sld>
+</file>
+
+<file path=ppt/slides/slide11.xml><?xml version="1.0" encoding="utf-8"?>
+<p:sld xmlns:a="http://schemas.openxmlformats.org/drawingml/2006/main" xmlns:r="http://schemas.openxmlformats.org/officeDocument/2006/relationships" xmlns:p="http://schemas.openxmlformats.org/presentationml/2006/main">
+  <p:cSld>
+    <p:spTree>
+      <p:nvGrpSpPr>
+        <p:cNvPr id="1" name=""/>
+        <p:cNvGrpSpPr/>
+        <p:nvPr/>
+      </p:nvGrpSpPr>
+      <p:grpSpPr>
+        <a:xfrm>
+          <a:off x="0" y="0"/>
+          <a:ext cx="0" cy="0"/>
+          <a:chOff x="0" y="0"/>
+          <a:chExt cx="0" cy="0"/>
+        </a:xfrm>
+      </p:grpSpPr>
+      <p:sp>
+        <p:nvSpPr>
+          <p:cNvPr id="2" name="Tijdelijke aanduiding voor tekst 1">
+            <a:extLst>
+              <a:ext uri="{FF2B5EF4-FFF2-40B4-BE49-F238E27FC236}">
+                <a16:creationId xmlns:a16="http://schemas.microsoft.com/office/drawing/2014/main" id="{6E35FEE2-51E9-8EFB-B0A5-D1B831A3BB7B}"/>
+              </a:ext>
+            </a:extLst>
+          </p:cNvPr>
+          <p:cNvSpPr>
+            <a:spLocks noGrp="1"/>
+          </p:cNvSpPr>
+          <p:nvPr>
+            <p:ph type="body" sz="quarter" idx="13"/>
+          </p:nvPr>
+        </p:nvSpPr>
+        <p:spPr/>
+        <p:txBody>
+          <a:bodyPr/>
+          <a:lstStyle/>
+          <a:p>
+            <a:r>
+              <a:rPr lang="nl-NL" dirty="0" err="1"/>
+              <a:t>lifecycle</a:t>
+            </a:r>
+            <a:endParaRPr lang="nl-NL" dirty="0"/>
+          </a:p>
+        </p:txBody>
+      </p:sp>
+    </p:spTree>
+    <p:extLst>
+      <p:ext uri="{BB962C8B-B14F-4D97-AF65-F5344CB8AC3E}">
+        <p14:creationId xmlns:p14="http://schemas.microsoft.com/office/powerpoint/2010/main" val="3007727432"/>
+      </p:ext>
+    </p:extLst>
+  </p:cSld>
+  <p:clrMapOvr>
+    <a:masterClrMapping/>
+  </p:clrMapOvr>
+</p:sld>
+</file>
+
+<file path=ppt/slides/slide12.xml><?xml version="1.0" encoding="utf-8"?>
+<p:sld xmlns:a="http://schemas.openxmlformats.org/drawingml/2006/main" xmlns:r="http://schemas.openxmlformats.org/officeDocument/2006/relationships" xmlns:p="http://schemas.openxmlformats.org/presentationml/2006/main">
+  <p:cSld>
+    <p:spTree>
+      <p:nvGrpSpPr>
+        <p:cNvPr id="1" name=""/>
+        <p:cNvGrpSpPr/>
+        <p:nvPr/>
+      </p:nvGrpSpPr>
+      <p:grpSpPr>
+        <a:xfrm>
+          <a:off x="0" y="0"/>
+          <a:ext cx="0" cy="0"/>
+          <a:chOff x="0" y="0"/>
+          <a:chExt cx="0" cy="0"/>
+        </a:xfrm>
+      </p:grpSpPr>
+      <p:sp>
+        <p:nvSpPr>
+          <p:cNvPr id="2" name="Tijdelijke aanduiding voor voettekst 1">
+            <a:extLst>
+              <a:ext uri="{FF2B5EF4-FFF2-40B4-BE49-F238E27FC236}">
+                <a16:creationId xmlns:a16="http://schemas.microsoft.com/office/drawing/2014/main" id="{A58A36B1-0A05-1A7E-4047-D48B016EF266}"/>
+              </a:ext>
+            </a:extLst>
+          </p:cNvPr>
+          <p:cNvSpPr>
+            <a:spLocks noGrp="1"/>
+          </p:cNvSpPr>
+          <p:nvPr>
+            <p:ph type="ftr" sz="quarter" idx="11"/>
+          </p:nvPr>
+        </p:nvSpPr>
+        <p:spPr/>
+        <p:txBody>
+          <a:bodyPr/>
+          <a:lstStyle/>
+          <a:p>
+            <a:r>
+              <a:rPr lang="en-GB"/>
+              <a:t>1.1</a:t>
+            </a:r>
+            <a:endParaRPr lang="en-NL"/>
+          </a:p>
+        </p:txBody>
+      </p:sp>
+    </p:spTree>
+    <p:extLst>
+      <p:ext uri="{BB962C8B-B14F-4D97-AF65-F5344CB8AC3E}">
+        <p14:creationId xmlns:p14="http://schemas.microsoft.com/office/powerpoint/2010/main" val="1238703048"/>
+      </p:ext>
+    </p:extLst>
+  </p:cSld>
+  <p:clrMapOvr>
+    <a:masterClrMapping/>
+  </p:clrMapOvr>
+</p:sld>
+</file>
+
+<file path=ppt/slides/slide13.xml><?xml version="1.0" encoding="utf-8"?>
+<p:sld xmlns:a="http://schemas.openxmlformats.org/drawingml/2006/main" xmlns:r="http://schemas.openxmlformats.org/officeDocument/2006/relationships" xmlns:p="http://schemas.openxmlformats.org/presentationml/2006/main">
+  <p:cSld>
+    <p:spTree>
+      <p:nvGrpSpPr>
+        <p:cNvPr id="1" name=""/>
+        <p:cNvGrpSpPr/>
+        <p:nvPr/>
+      </p:nvGrpSpPr>
+      <p:grpSpPr>
+        <a:xfrm>
+          <a:off x="0" y="0"/>
+          <a:ext cx="0" cy="0"/>
+          <a:chOff x="0" y="0"/>
+          <a:chExt cx="0" cy="0"/>
+        </a:xfrm>
+      </p:grpSpPr>
+      <p:sp>
+        <p:nvSpPr>
+          <p:cNvPr id="2" name="Tijdelijke aanduiding voor tekst 1">
+            <a:extLst>
+              <a:ext uri="{FF2B5EF4-FFF2-40B4-BE49-F238E27FC236}">
+                <a16:creationId xmlns:a16="http://schemas.microsoft.com/office/drawing/2014/main" id="{3B9B380A-4BAF-FD23-AE02-AEF54C57516F}"/>
+              </a:ext>
+            </a:extLst>
+          </p:cNvPr>
+          <p:cNvSpPr>
+            <a:spLocks noGrp="1"/>
+          </p:cNvSpPr>
+          <p:nvPr>
+            <p:ph type="body" sz="quarter" idx="13"/>
+          </p:nvPr>
+        </p:nvSpPr>
+        <p:spPr/>
+        <p:txBody>
+          <a:bodyPr/>
+          <a:lstStyle/>
+          <a:p>
+            <a:r>
+              <a:rPr lang="nl-NL" dirty="0"/>
+              <a:t>Risk</a:t>
+            </a:r>
+          </a:p>
+        </p:txBody>
+      </p:sp>
+    </p:spTree>
+    <p:extLst>
+      <p:ext uri="{BB962C8B-B14F-4D97-AF65-F5344CB8AC3E}">
+        <p14:creationId xmlns:p14="http://schemas.microsoft.com/office/powerpoint/2010/main" val="3905389854"/>
+      </p:ext>
+    </p:extLst>
+  </p:cSld>
+  <p:clrMapOvr>
+    <a:masterClrMapping/>
+  </p:clrMapOvr>
+</p:sld>
+</file>
+
+<file path=ppt/slides/slide14.xml><?xml version="1.0" encoding="utf-8"?>
+<p:sld xmlns:a="http://schemas.openxmlformats.org/drawingml/2006/main" xmlns:r="http://schemas.openxmlformats.org/officeDocument/2006/relationships" xmlns:p="http://schemas.openxmlformats.org/presentationml/2006/main">
+  <p:cSld>
+    <p:spTree>
+      <p:nvGrpSpPr>
+        <p:cNvPr id="1" name=""/>
+        <p:cNvGrpSpPr/>
+        <p:nvPr/>
+      </p:nvGrpSpPr>
+      <p:grpSpPr>
+        <a:xfrm>
+          <a:off x="0" y="0"/>
+          <a:ext cx="0" cy="0"/>
+          <a:chOff x="0" y="0"/>
+          <a:chExt cx="0" cy="0"/>
+        </a:xfrm>
+      </p:grpSpPr>
+      <p:sp>
+        <p:nvSpPr>
+          <p:cNvPr id="2" name="Tijdelijke aanduiding voor voettekst 1">
+            <a:extLst>
+              <a:ext uri="{FF2B5EF4-FFF2-40B4-BE49-F238E27FC236}">
                 <a16:creationId xmlns:a16="http://schemas.microsoft.com/office/drawing/2014/main" id="{A946A034-0DD5-05C9-B222-532886391C0F}"/>
               </a:ext>
             </a:extLst>
@@ -15424,7 +15527,7 @@
           <a:p>
             <a:r>
               <a:rPr lang="en-GB"/>
-              <a:t>V 1.0</a:t>
+              <a:t>1.1</a:t>
             </a:r>
             <a:endParaRPr lang="en-NL"/>
           </a:p>
@@ -15443,7 +15546,7 @@
 </p:sld>
 </file>
 
-<file path=ppt/slides/slide11.xml><?xml version="1.0" encoding="utf-8"?>
+<file path=ppt/slides/slide15.xml><?xml version="1.0" encoding="utf-8"?>
 <p:sld xmlns:a="http://schemas.openxmlformats.org/drawingml/2006/main" xmlns:r="http://schemas.openxmlformats.org/officeDocument/2006/relationships" xmlns:p="http://schemas.openxmlformats.org/presentationml/2006/main">
   <p:cSld>
     <p:spTree>
@@ -15501,7 +15604,7 @@
 </p:sld>
 </file>
 
-<file path=ppt/slides/slide12.xml><?xml version="1.0" encoding="utf-8"?>
+<file path=ppt/slides/slide16.xml><?xml version="1.0" encoding="utf-8"?>
 <p:sld xmlns:a="http://schemas.openxmlformats.org/drawingml/2006/main" xmlns:r="http://schemas.openxmlformats.org/officeDocument/2006/relationships" xmlns:p="http://schemas.openxmlformats.org/presentationml/2006/main">
   <p:cSld>
     <p:spTree>
@@ -15541,7 +15644,7 @@
           <a:p>
             <a:r>
               <a:rPr lang="en-GB"/>
-              <a:t>V 1.0</a:t>
+              <a:t>1.1</a:t>
             </a:r>
             <a:endParaRPr lang="en-NL"/>
           </a:p>
@@ -15560,7 +15663,7 @@
 </p:sld>
 </file>
 
-<file path=ppt/slides/slide13.xml><?xml version="1.0" encoding="utf-8"?>
+<file path=ppt/slides/slide17.xml><?xml version="1.0" encoding="utf-8"?>
 <p:sld xmlns:a="http://schemas.openxmlformats.org/drawingml/2006/main" xmlns:r="http://schemas.openxmlformats.org/officeDocument/2006/relationships" xmlns:p="http://schemas.openxmlformats.org/presentationml/2006/main">
   <p:cSld>
     <p:spTree>
@@ -15623,7 +15726,7 @@
 </p:sld>
 </file>
 
-<file path=ppt/slides/slide14.xml><?xml version="1.0" encoding="utf-8"?>
+<file path=ppt/slides/slide18.xml><?xml version="1.0" encoding="utf-8"?>
 <p:sld xmlns:a="http://schemas.openxmlformats.org/drawingml/2006/main" xmlns:r="http://schemas.openxmlformats.org/officeDocument/2006/relationships" xmlns:p="http://schemas.openxmlformats.org/presentationml/2006/main">
   <p:cSld>
     <p:spTree>
@@ -15663,7 +15766,7 @@
           <a:p>
             <a:r>
               <a:rPr lang="en-GB"/>
-              <a:t>V 1.0</a:t>
+              <a:t>1.1</a:t>
             </a:r>
             <a:endParaRPr lang="en-NL"/>
           </a:p>
@@ -15682,7 +15785,7 @@
 </p:sld>
 </file>
 
-<file path=ppt/slides/slide15.xml><?xml version="1.0" encoding="utf-8"?>
+<file path=ppt/slides/slide19.xml><?xml version="1.0" encoding="utf-8"?>
 <p:sld xmlns:a="http://schemas.openxmlformats.org/drawingml/2006/main" xmlns:r="http://schemas.openxmlformats.org/officeDocument/2006/relationships" xmlns:p="http://schemas.openxmlformats.org/presentationml/2006/main">
   <p:cSld>
     <p:spTree>
@@ -15741,258 +15844,6 @@
 </p:sld>
 </file>
 
-<file path=ppt/slides/slide16.xml><?xml version="1.0" encoding="utf-8"?>
-<p:sld xmlns:a="http://schemas.openxmlformats.org/drawingml/2006/main" xmlns:r="http://schemas.openxmlformats.org/officeDocument/2006/relationships" xmlns:p="http://schemas.openxmlformats.org/presentationml/2006/main">
-  <p:cSld>
-    <p:spTree>
-      <p:nvGrpSpPr>
-        <p:cNvPr id="1" name=""/>
-        <p:cNvGrpSpPr/>
-        <p:nvPr/>
-      </p:nvGrpSpPr>
-      <p:grpSpPr>
-        <a:xfrm>
-          <a:off x="0" y="0"/>
-          <a:ext cx="0" cy="0"/>
-          <a:chOff x="0" y="0"/>
-          <a:chExt cx="0" cy="0"/>
-        </a:xfrm>
-      </p:grpSpPr>
-      <p:sp>
-        <p:nvSpPr>
-          <p:cNvPr id="2" name="Tijdelijke aanduiding voor voettekst 1">
-            <a:extLst>
-              <a:ext uri="{FF2B5EF4-FFF2-40B4-BE49-F238E27FC236}">
-                <a16:creationId xmlns:a16="http://schemas.microsoft.com/office/drawing/2014/main" id="{ED52E628-97C7-84B6-EA0B-529C87F8B0F8}"/>
-              </a:ext>
-            </a:extLst>
-          </p:cNvPr>
-          <p:cNvSpPr>
-            <a:spLocks noGrp="1"/>
-          </p:cNvSpPr>
-          <p:nvPr>
-            <p:ph type="ftr" sz="quarter" idx="11"/>
-          </p:nvPr>
-        </p:nvSpPr>
-        <p:spPr/>
-        <p:txBody>
-          <a:bodyPr/>
-          <a:lstStyle/>
-          <a:p>
-            <a:r>
-              <a:rPr lang="en-GB"/>
-              <a:t>V 1.0</a:t>
-            </a:r>
-            <a:endParaRPr lang="en-NL"/>
-          </a:p>
-        </p:txBody>
-      </p:sp>
-    </p:spTree>
-    <p:extLst>
-      <p:ext uri="{BB962C8B-B14F-4D97-AF65-F5344CB8AC3E}">
-        <p14:creationId xmlns:p14="http://schemas.microsoft.com/office/powerpoint/2010/main" val="3961419606"/>
-      </p:ext>
-    </p:extLst>
-  </p:cSld>
-  <p:clrMapOvr>
-    <a:masterClrMapping/>
-  </p:clrMapOvr>
-</p:sld>
-</file>
-
-<file path=ppt/slides/slide17.xml><?xml version="1.0" encoding="utf-8"?>
-<p:sld xmlns:a="http://schemas.openxmlformats.org/drawingml/2006/main" xmlns:r="http://schemas.openxmlformats.org/officeDocument/2006/relationships" xmlns:p="http://schemas.openxmlformats.org/presentationml/2006/main">
-  <p:cSld>
-    <p:spTree>
-      <p:nvGrpSpPr>
-        <p:cNvPr id="1" name=""/>
-        <p:cNvGrpSpPr/>
-        <p:nvPr/>
-      </p:nvGrpSpPr>
-      <p:grpSpPr>
-        <a:xfrm>
-          <a:off x="0" y="0"/>
-          <a:ext cx="0" cy="0"/>
-          <a:chOff x="0" y="0"/>
-          <a:chExt cx="0" cy="0"/>
-        </a:xfrm>
-      </p:grpSpPr>
-      <p:sp>
-        <p:nvSpPr>
-          <p:cNvPr id="2" name="Tijdelijke aanduiding voor tekst 1">
-            <a:extLst>
-              <a:ext uri="{FF2B5EF4-FFF2-40B4-BE49-F238E27FC236}">
-                <a16:creationId xmlns:a16="http://schemas.microsoft.com/office/drawing/2014/main" id="{FFE196FC-5CE7-71CA-9AE8-949084735FB7}"/>
-              </a:ext>
-            </a:extLst>
-          </p:cNvPr>
-          <p:cNvSpPr>
-            <a:spLocks noGrp="1"/>
-          </p:cNvSpPr>
-          <p:nvPr>
-            <p:ph type="body" sz="quarter" idx="12"/>
-          </p:nvPr>
-        </p:nvSpPr>
-        <p:spPr/>
-        <p:txBody>
-          <a:bodyPr/>
-          <a:lstStyle/>
-          <a:p>
-            <a:r>
-              <a:rPr lang="nl-NL" dirty="0" err="1"/>
-              <a:t>Once</a:t>
-            </a:r>
-            <a:r>
-              <a:rPr lang="nl-NL" dirty="0"/>
-              <a:t> &amp; </a:t>
-            </a:r>
-            <a:r>
-              <a:rPr lang="nl-NL" dirty="0" err="1"/>
-              <a:t>done</a:t>
-            </a:r>
-            <a:endParaRPr lang="nl-NL" dirty="0"/>
-          </a:p>
-        </p:txBody>
-      </p:sp>
-    </p:spTree>
-    <p:extLst>
-      <p:ext uri="{BB962C8B-B14F-4D97-AF65-F5344CB8AC3E}">
-        <p14:creationId xmlns:p14="http://schemas.microsoft.com/office/powerpoint/2010/main" val="214567256"/>
-      </p:ext>
-    </p:extLst>
-  </p:cSld>
-  <p:clrMapOvr>
-    <a:masterClrMapping/>
-  </p:clrMapOvr>
-</p:sld>
-</file>
-
-<file path=ppt/slides/slide18.xml><?xml version="1.0" encoding="utf-8"?>
-<p:sld xmlns:a="http://schemas.openxmlformats.org/drawingml/2006/main" xmlns:r="http://schemas.openxmlformats.org/officeDocument/2006/relationships" xmlns:p="http://schemas.openxmlformats.org/presentationml/2006/main">
-  <p:cSld>
-    <p:spTree>
-      <p:nvGrpSpPr>
-        <p:cNvPr id="1" name=""/>
-        <p:cNvGrpSpPr/>
-        <p:nvPr/>
-      </p:nvGrpSpPr>
-      <p:grpSpPr>
-        <a:xfrm>
-          <a:off x="0" y="0"/>
-          <a:ext cx="0" cy="0"/>
-          <a:chOff x="0" y="0"/>
-          <a:chExt cx="0" cy="0"/>
-        </a:xfrm>
-      </p:grpSpPr>
-      <p:sp>
-        <p:nvSpPr>
-          <p:cNvPr id="2" name="Tijdelijke aanduiding voor voettekst 1">
-            <a:extLst>
-              <a:ext uri="{FF2B5EF4-FFF2-40B4-BE49-F238E27FC236}">
-                <a16:creationId xmlns:a16="http://schemas.microsoft.com/office/drawing/2014/main" id="{E1B86FFD-6927-8AA9-41F7-0AA541198A36}"/>
-              </a:ext>
-            </a:extLst>
-          </p:cNvPr>
-          <p:cNvSpPr>
-            <a:spLocks noGrp="1"/>
-          </p:cNvSpPr>
-          <p:nvPr>
-            <p:ph type="ftr" sz="quarter" idx="11"/>
-          </p:nvPr>
-        </p:nvSpPr>
-        <p:spPr/>
-        <p:txBody>
-          <a:bodyPr/>
-          <a:lstStyle/>
-          <a:p>
-            <a:r>
-              <a:rPr lang="en-GB"/>
-              <a:t>V 1.0</a:t>
-            </a:r>
-            <a:endParaRPr lang="en-NL"/>
-          </a:p>
-        </p:txBody>
-      </p:sp>
-    </p:spTree>
-    <p:extLst>
-      <p:ext uri="{BB962C8B-B14F-4D97-AF65-F5344CB8AC3E}">
-        <p14:creationId xmlns:p14="http://schemas.microsoft.com/office/powerpoint/2010/main" val="969410986"/>
-      </p:ext>
-    </p:extLst>
-  </p:cSld>
-  <p:clrMapOvr>
-    <a:masterClrMapping/>
-  </p:clrMapOvr>
-</p:sld>
-</file>
-
-<file path=ppt/slides/slide19.xml><?xml version="1.0" encoding="utf-8"?>
-<p:sld xmlns:a="http://schemas.openxmlformats.org/drawingml/2006/main" xmlns:r="http://schemas.openxmlformats.org/officeDocument/2006/relationships" xmlns:p="http://schemas.openxmlformats.org/presentationml/2006/main">
-  <p:cSld>
-    <p:spTree>
-      <p:nvGrpSpPr>
-        <p:cNvPr id="1" name=""/>
-        <p:cNvGrpSpPr/>
-        <p:nvPr/>
-      </p:nvGrpSpPr>
-      <p:grpSpPr>
-        <a:xfrm>
-          <a:off x="0" y="0"/>
-          <a:ext cx="0" cy="0"/>
-          <a:chOff x="0" y="0"/>
-          <a:chExt cx="0" cy="0"/>
-        </a:xfrm>
-      </p:grpSpPr>
-      <p:sp>
-        <p:nvSpPr>
-          <p:cNvPr id="2" name="Tijdelijke aanduiding voor tekst 1">
-            <a:extLst>
-              <a:ext uri="{FF2B5EF4-FFF2-40B4-BE49-F238E27FC236}">
-                <a16:creationId xmlns:a16="http://schemas.microsoft.com/office/drawing/2014/main" id="{79E28D4B-3C67-B96D-4885-75BA7D938F11}"/>
-              </a:ext>
-            </a:extLst>
-          </p:cNvPr>
-          <p:cNvSpPr>
-            <a:spLocks noGrp="1"/>
-          </p:cNvSpPr>
-          <p:nvPr>
-            <p:ph type="body" sz="quarter" idx="12"/>
-          </p:nvPr>
-        </p:nvSpPr>
-        <p:spPr/>
-        <p:txBody>
-          <a:bodyPr/>
-          <a:lstStyle/>
-          <a:p>
-            <a:r>
-              <a:rPr lang="nl-NL" dirty="0" err="1"/>
-              <a:t>Ongoing</a:t>
-            </a:r>
-            <a:r>
-              <a:rPr lang="nl-NL" dirty="0"/>
-              <a:t> </a:t>
-            </a:r>
-            <a:r>
-              <a:rPr lang="nl-NL" dirty="0" err="1"/>
-              <a:t>evolution</a:t>
-            </a:r>
-            <a:endParaRPr lang="nl-NL" dirty="0"/>
-          </a:p>
-        </p:txBody>
-      </p:sp>
-    </p:spTree>
-    <p:extLst>
-      <p:ext uri="{BB962C8B-B14F-4D97-AF65-F5344CB8AC3E}">
-        <p14:creationId xmlns:p14="http://schemas.microsoft.com/office/powerpoint/2010/main" val="3375735319"/>
-      </p:ext>
-    </p:extLst>
-  </p:cSld>
-  <p:clrMapOvr>
-    <a:masterClrMapping/>
-  </p:clrMapOvr>
-</p:sld>
-</file>
-
 <file path=ppt/slides/slide2.xml><?xml version="1.0" encoding="utf-8"?>
 <p:sld xmlns:a="http://schemas.openxmlformats.org/drawingml/2006/main" xmlns:r="http://schemas.openxmlformats.org/officeDocument/2006/relationships" xmlns:p="http://schemas.openxmlformats.org/presentationml/2006/main">
   <p:cSld>
@@ -16033,7 +15884,7 @@
           <a:p>
             <a:r>
               <a:rPr lang="en-GB"/>
-              <a:t>V 1.0</a:t>
+              <a:t>1.1</a:t>
             </a:r>
             <a:endParaRPr lang="en-NL"/>
           </a:p>
@@ -16074,7 +15925,7 @@
           <p:cNvPr id="2" name="Tijdelijke aanduiding voor voettekst 1">
             <a:extLst>
               <a:ext uri="{FF2B5EF4-FFF2-40B4-BE49-F238E27FC236}">
-                <a16:creationId xmlns:a16="http://schemas.microsoft.com/office/drawing/2014/main" id="{E1B86FFD-6927-8AA9-41F7-0AA541198A36}"/>
+                <a16:creationId xmlns:a16="http://schemas.microsoft.com/office/drawing/2014/main" id="{ED52E628-97C7-84B6-EA0B-529C87F8B0F8}"/>
               </a:ext>
             </a:extLst>
           </p:cNvPr>
@@ -16092,7 +15943,7 @@
           <a:p>
             <a:r>
               <a:rPr lang="en-GB"/>
-              <a:t>V 1.0</a:t>
+              <a:t>1.1</a:t>
             </a:r>
             <a:endParaRPr lang="en-NL"/>
           </a:p>
@@ -16101,7 +15952,7 @@
     </p:spTree>
     <p:extLst>
       <p:ext uri="{BB962C8B-B14F-4D97-AF65-F5344CB8AC3E}">
-        <p14:creationId xmlns:p14="http://schemas.microsoft.com/office/powerpoint/2010/main" val="2809627686"/>
+        <p14:creationId xmlns:p14="http://schemas.microsoft.com/office/powerpoint/2010/main" val="3961419606"/>
       </p:ext>
     </p:extLst>
   </p:cSld>
@@ -16133,7 +15984,7 @@
           <p:cNvPr id="2" name="Tijdelijke aanduiding voor tekst 1">
             <a:extLst>
               <a:ext uri="{FF2B5EF4-FFF2-40B4-BE49-F238E27FC236}">
-                <a16:creationId xmlns:a16="http://schemas.microsoft.com/office/drawing/2014/main" id="{9A3F6BE5-C940-8E55-0213-CA18167AC2F5}"/>
+                <a16:creationId xmlns:a16="http://schemas.microsoft.com/office/drawing/2014/main" id="{C1315D57-D183-649B-FC3F-345C1A31DBEA}"/>
               </a:ext>
             </a:extLst>
           </p:cNvPr>
@@ -16141,7 +15992,7 @@
             <a:spLocks noGrp="1"/>
           </p:cNvSpPr>
           <p:nvPr>
-            <p:ph type="body" sz="quarter" idx="12"/>
+            <p:ph type="body" sz="quarter" idx="13"/>
           </p:nvPr>
         </p:nvSpPr>
         <p:spPr/>
@@ -16150,31 +16001,16 @@
           <a:lstStyle/>
           <a:p>
             <a:r>
-              <a:rPr lang="en-NL" sz="6000">
-                <a:latin typeface="American Captain" pitchFamily="2" charset="77"/>
-              </a:rPr>
-              <a:t>A plan broken down</a:t>
+              <a:rPr lang="nl-NL" dirty="0"/>
+              <a:t>Performance</a:t>
             </a:r>
-            <a:r>
-              <a:rPr lang="nl-NL" sz="6000" dirty="0">
-                <a:latin typeface="American Captain" pitchFamily="2" charset="77"/>
-              </a:rPr>
-              <a:t> </a:t>
-            </a:r>
-            <a:r>
-              <a:rPr lang="en-NL" sz="6000">
-                <a:latin typeface="American Captain" pitchFamily="2" charset="77"/>
-              </a:rPr>
-              <a:t>into smaller pieces</a:t>
-            </a:r>
-            <a:endParaRPr lang="nl-NL" dirty="0"/>
           </a:p>
         </p:txBody>
       </p:sp>
     </p:spTree>
     <p:extLst>
       <p:ext uri="{BB962C8B-B14F-4D97-AF65-F5344CB8AC3E}">
-        <p14:creationId xmlns:p14="http://schemas.microsoft.com/office/powerpoint/2010/main" val="2352940292"/>
+        <p14:creationId xmlns:p14="http://schemas.microsoft.com/office/powerpoint/2010/main" val="1727377494"/>
       </p:ext>
     </p:extLst>
   </p:cSld>
@@ -16206,7 +16042,7 @@
           <p:cNvPr id="2" name="Tijdelijke aanduiding voor voettekst 1">
             <a:extLst>
               <a:ext uri="{FF2B5EF4-FFF2-40B4-BE49-F238E27FC236}">
-                <a16:creationId xmlns:a16="http://schemas.microsoft.com/office/drawing/2014/main" id="{E1B86FFD-6927-8AA9-41F7-0AA541198A36}"/>
+                <a16:creationId xmlns:a16="http://schemas.microsoft.com/office/drawing/2014/main" id="{ED52E628-97C7-84B6-EA0B-529C87F8B0F8}"/>
               </a:ext>
             </a:extLst>
           </p:cNvPr>
@@ -16224,7 +16060,7 @@
           <a:p>
             <a:r>
               <a:rPr lang="en-GB"/>
-              <a:t>V 1.0</a:t>
+              <a:t>1.1</a:t>
             </a:r>
             <a:endParaRPr lang="en-NL"/>
           </a:p>
@@ -16233,7 +16069,7 @@
     </p:spTree>
     <p:extLst>
       <p:ext uri="{BB962C8B-B14F-4D97-AF65-F5344CB8AC3E}">
-        <p14:creationId xmlns:p14="http://schemas.microsoft.com/office/powerpoint/2010/main" val="3769443852"/>
+        <p14:creationId xmlns:p14="http://schemas.microsoft.com/office/powerpoint/2010/main" val="1102482855"/>
       </p:ext>
     </p:extLst>
   </p:cSld>
@@ -16262,10 +16098,10 @@
       </p:grpSpPr>
       <p:sp>
         <p:nvSpPr>
-          <p:cNvPr id="3" name="Tijdelijke aanduiding voor tekst 2">
+          <p:cNvPr id="2" name="Tijdelijke aanduiding voor tekst 1">
             <a:extLst>
               <a:ext uri="{FF2B5EF4-FFF2-40B4-BE49-F238E27FC236}">
-                <a16:creationId xmlns:a16="http://schemas.microsoft.com/office/drawing/2014/main" id="{33AF8EE4-6F54-DEFE-4B87-24556EF59A54}"/>
+                <a16:creationId xmlns:a16="http://schemas.microsoft.com/office/drawing/2014/main" id="{FFE196FC-5CE7-71CA-9AE8-949084735FB7}"/>
               </a:ext>
             </a:extLst>
           </p:cNvPr>
@@ -16282,19 +16118,25 @@
           <a:lstStyle/>
           <a:p>
             <a:r>
-              <a:rPr lang="en-NL" sz="6000">
-                <a:latin typeface="American Captain" pitchFamily="2" charset="77"/>
-              </a:rPr>
-              <a:t>Upfront analysis</a:t>
+              <a:rPr lang="nl-NL" sz="8800" dirty="0" err="1"/>
+              <a:t>Once</a:t>
             </a:r>
-            <a:endParaRPr lang="nl-NL" dirty="0"/>
+            <a:r>
+              <a:rPr lang="nl-NL" sz="8800" dirty="0"/>
+              <a:t> &amp; </a:t>
+            </a:r>
+            <a:r>
+              <a:rPr lang="nl-NL" sz="8800" dirty="0" err="1"/>
+              <a:t>done</a:t>
+            </a:r>
+            <a:endParaRPr lang="nl-NL" sz="8800" dirty="0"/>
           </a:p>
         </p:txBody>
       </p:sp>
     </p:spTree>
     <p:extLst>
       <p:ext uri="{BB962C8B-B14F-4D97-AF65-F5344CB8AC3E}">
-        <p14:creationId xmlns:p14="http://schemas.microsoft.com/office/powerpoint/2010/main" val="3758910535"/>
+        <p14:creationId xmlns:p14="http://schemas.microsoft.com/office/powerpoint/2010/main" val="214567256"/>
       </p:ext>
     </p:extLst>
   </p:cSld>
@@ -16344,7 +16186,7 @@
           <a:p>
             <a:r>
               <a:rPr lang="en-GB"/>
-              <a:t>V 1.0</a:t>
+              <a:t>1.1</a:t>
             </a:r>
             <a:endParaRPr lang="en-NL"/>
           </a:p>
@@ -16353,7 +16195,7 @@
     </p:spTree>
     <p:extLst>
       <p:ext uri="{BB962C8B-B14F-4D97-AF65-F5344CB8AC3E}">
-        <p14:creationId xmlns:p14="http://schemas.microsoft.com/office/powerpoint/2010/main" val="185723204"/>
+        <p14:creationId xmlns:p14="http://schemas.microsoft.com/office/powerpoint/2010/main" val="969410986"/>
       </p:ext>
     </p:extLst>
   </p:cSld>
@@ -16382,10 +16224,10 @@
       </p:grpSpPr>
       <p:sp>
         <p:nvSpPr>
-          <p:cNvPr id="3" name="Tijdelijke aanduiding voor tekst 2">
+          <p:cNvPr id="2" name="Tijdelijke aanduiding voor tekst 1">
             <a:extLst>
               <a:ext uri="{FF2B5EF4-FFF2-40B4-BE49-F238E27FC236}">
-                <a16:creationId xmlns:a16="http://schemas.microsoft.com/office/drawing/2014/main" id="{C8F3C1BE-E159-A4F5-B651-E46CFB437A67}"/>
+                <a16:creationId xmlns:a16="http://schemas.microsoft.com/office/drawing/2014/main" id="{79E28D4B-3C67-B96D-4885-75BA7D938F11}"/>
               </a:ext>
             </a:extLst>
           </p:cNvPr>
@@ -16402,31 +16244,25 @@
           <a:lstStyle/>
           <a:p>
             <a:r>
-              <a:rPr lang="en-NL" sz="6000">
-                <a:latin typeface="American Captain" pitchFamily="2" charset="77"/>
-              </a:rPr>
-              <a:t>Just-in-time</a:t>
+              <a:rPr lang="nl-NL" sz="8800" dirty="0" err="1"/>
+              <a:t>Ongoing</a:t>
             </a:r>
             <a:r>
-              <a:rPr lang="nl-NL" sz="6000" dirty="0">
-                <a:latin typeface="American Captain" pitchFamily="2" charset="77"/>
-              </a:rPr>
+              <a:rPr lang="nl-NL" sz="8800" dirty="0"/>
               <a:t> </a:t>
             </a:r>
             <a:r>
-              <a:rPr lang="en-NL" sz="6000">
-                <a:latin typeface="American Captain" pitchFamily="2" charset="77"/>
-              </a:rPr>
-              <a:t>resolution</a:t>
+              <a:rPr lang="nl-NL" sz="8800" dirty="0" err="1"/>
+              <a:t>evolution</a:t>
             </a:r>
-            <a:endParaRPr lang="nl-NL" dirty="0"/>
+            <a:endParaRPr lang="nl-NL" sz="8800" dirty="0"/>
           </a:p>
         </p:txBody>
       </p:sp>
     </p:spTree>
     <p:extLst>
       <p:ext uri="{BB962C8B-B14F-4D97-AF65-F5344CB8AC3E}">
-        <p14:creationId xmlns:p14="http://schemas.microsoft.com/office/powerpoint/2010/main" val="1767558030"/>
+        <p14:creationId xmlns:p14="http://schemas.microsoft.com/office/powerpoint/2010/main" val="3375735319"/>
       </p:ext>
     </p:extLst>
   </p:cSld>
@@ -16476,7 +16312,7 @@
           <a:p>
             <a:r>
               <a:rPr lang="en-GB"/>
-              <a:t>V 1.0</a:t>
+              <a:t>1.1</a:t>
             </a:r>
             <a:endParaRPr lang="en-NL"/>
           </a:p>
@@ -16485,7 +16321,7 @@
     </p:spTree>
     <p:extLst>
       <p:ext uri="{BB962C8B-B14F-4D97-AF65-F5344CB8AC3E}">
-        <p14:creationId xmlns:p14="http://schemas.microsoft.com/office/powerpoint/2010/main" val="365145281"/>
+        <p14:creationId xmlns:p14="http://schemas.microsoft.com/office/powerpoint/2010/main" val="2809627686"/>
       </p:ext>
     </p:extLst>
   </p:cSld>
@@ -16514,10 +16350,10 @@
       </p:grpSpPr>
       <p:sp>
         <p:nvSpPr>
-          <p:cNvPr id="3" name="Tijdelijke aanduiding voor tekst 2">
+          <p:cNvPr id="2" name="Tijdelijke aanduiding voor tekst 1">
             <a:extLst>
               <a:ext uri="{FF2B5EF4-FFF2-40B4-BE49-F238E27FC236}">
-                <a16:creationId xmlns:a16="http://schemas.microsoft.com/office/drawing/2014/main" id="{2BB4E071-6FB3-8CFF-2E19-CB6A92324F8A}"/>
+                <a16:creationId xmlns:a16="http://schemas.microsoft.com/office/drawing/2014/main" id="{9A3F6BE5-C940-8E55-0213-CA18167AC2F5}"/>
               </a:ext>
             </a:extLst>
           </p:cNvPr>
@@ -16528,37 +16364,42 @@
             <p:ph type="body" sz="quarter" idx="12"/>
           </p:nvPr>
         </p:nvSpPr>
-        <p:spPr/>
+        <p:spPr>
+          <a:xfrm>
+            <a:off x="810418" y="2001495"/>
+            <a:ext cx="6154737" cy="1990725"/>
+          </a:xfrm>
+        </p:spPr>
         <p:txBody>
           <a:bodyPr/>
           <a:lstStyle/>
           <a:p>
             <a:r>
-              <a:rPr lang="en-NL" sz="6000">
+              <a:rPr lang="en-NL" sz="8800" dirty="0">
                 <a:latin typeface="American Captain" pitchFamily="2" charset="77"/>
               </a:rPr>
-              <a:t>Focus on Scope, </a:t>
+              <a:t>A plan broken down</a:t>
             </a:r>
             <a:r>
-              <a:rPr lang="nl-NL" sz="6000" dirty="0">
+              <a:rPr lang="nl-NL" sz="8800" dirty="0">
                 <a:latin typeface="American Captain" pitchFamily="2" charset="77"/>
               </a:rPr>
-              <a:t>         </a:t>
+              <a:t> </a:t>
             </a:r>
             <a:r>
-              <a:rPr lang="en-NL" sz="6000">
+              <a:rPr lang="en-NL" sz="8800" dirty="0">
                 <a:latin typeface="American Captain" pitchFamily="2" charset="77"/>
               </a:rPr>
-              <a:t>time &amp; budget</a:t>
+              <a:t>into smaller pieces</a:t>
             </a:r>
-            <a:endParaRPr lang="nl-NL" dirty="0"/>
+            <a:endParaRPr lang="nl-NL" sz="8000" dirty="0"/>
           </a:p>
         </p:txBody>
       </p:sp>
     </p:spTree>
     <p:extLst>
       <p:ext uri="{BB962C8B-B14F-4D97-AF65-F5344CB8AC3E}">
-        <p14:creationId xmlns:p14="http://schemas.microsoft.com/office/powerpoint/2010/main" val="382183876"/>
+        <p14:creationId xmlns:p14="http://schemas.microsoft.com/office/powerpoint/2010/main" val="2352940292"/>
       </p:ext>
     </p:extLst>
   </p:cSld>
@@ -16608,7 +16449,698 @@
           <a:p>
             <a:r>
               <a:rPr lang="en-GB"/>
-              <a:t>V 1.0</a:t>
+              <a:t>1.1</a:t>
+            </a:r>
+            <a:endParaRPr lang="en-NL"/>
+          </a:p>
+        </p:txBody>
+      </p:sp>
+    </p:spTree>
+    <p:extLst>
+      <p:ext uri="{BB962C8B-B14F-4D97-AF65-F5344CB8AC3E}">
+        <p14:creationId xmlns:p14="http://schemas.microsoft.com/office/powerpoint/2010/main" val="3769443852"/>
+      </p:ext>
+    </p:extLst>
+  </p:cSld>
+  <p:clrMapOvr>
+    <a:masterClrMapping/>
+  </p:clrMapOvr>
+</p:sld>
+</file>
+
+<file path=ppt/slides/slide29.xml><?xml version="1.0" encoding="utf-8"?>
+<p:sld xmlns:a="http://schemas.openxmlformats.org/drawingml/2006/main" xmlns:r="http://schemas.openxmlformats.org/officeDocument/2006/relationships" xmlns:p="http://schemas.openxmlformats.org/presentationml/2006/main">
+  <p:cSld>
+    <p:spTree>
+      <p:nvGrpSpPr>
+        <p:cNvPr id="1" name=""/>
+        <p:cNvGrpSpPr/>
+        <p:nvPr/>
+      </p:nvGrpSpPr>
+      <p:grpSpPr>
+        <a:xfrm>
+          <a:off x="0" y="0"/>
+          <a:ext cx="0" cy="0"/>
+          <a:chOff x="0" y="0"/>
+          <a:chExt cx="0" cy="0"/>
+        </a:xfrm>
+      </p:grpSpPr>
+      <p:sp>
+        <p:nvSpPr>
+          <p:cNvPr id="2" name="Tijdelijke aanduiding voor tekst 1">
+            <a:extLst>
+              <a:ext uri="{FF2B5EF4-FFF2-40B4-BE49-F238E27FC236}">
+                <a16:creationId xmlns:a16="http://schemas.microsoft.com/office/drawing/2014/main" id="{9A3F6BE5-C940-8E55-0213-CA18167AC2F5}"/>
+              </a:ext>
+            </a:extLst>
+          </p:cNvPr>
+          <p:cNvSpPr>
+            <a:spLocks noGrp="1"/>
+          </p:cNvSpPr>
+          <p:nvPr>
+            <p:ph type="body" sz="quarter" idx="12"/>
+          </p:nvPr>
+        </p:nvSpPr>
+        <p:spPr>
+          <a:xfrm>
+            <a:off x="810418" y="2001495"/>
+            <a:ext cx="6154737" cy="1990725"/>
+          </a:xfrm>
+        </p:spPr>
+        <p:txBody>
+          <a:bodyPr/>
+          <a:lstStyle/>
+          <a:p>
+            <a:r>
+              <a:rPr lang="en-GB" sz="8800" dirty="0">
+                <a:latin typeface="American Captain" pitchFamily="2" charset="77"/>
+              </a:rPr>
+              <a:t>Achieving incremental goals</a:t>
+            </a:r>
+            <a:endParaRPr lang="nl-NL" sz="8000" dirty="0"/>
+          </a:p>
+        </p:txBody>
+      </p:sp>
+    </p:spTree>
+    <p:extLst>
+      <p:ext uri="{BB962C8B-B14F-4D97-AF65-F5344CB8AC3E}">
+        <p14:creationId xmlns:p14="http://schemas.microsoft.com/office/powerpoint/2010/main" val="3042763879"/>
+      </p:ext>
+    </p:extLst>
+  </p:cSld>
+  <p:clrMapOvr>
+    <a:masterClrMapping/>
+  </p:clrMapOvr>
+</p:sld>
+</file>
+
+<file path=ppt/slides/slide3.xml><?xml version="1.0" encoding="utf-8"?>
+<p:sld xmlns:a="http://schemas.openxmlformats.org/drawingml/2006/main" xmlns:r="http://schemas.openxmlformats.org/officeDocument/2006/relationships" xmlns:p="http://schemas.openxmlformats.org/presentationml/2006/main">
+  <p:cSld>
+    <p:spTree>
+      <p:nvGrpSpPr>
+        <p:cNvPr id="1" name=""/>
+        <p:cNvGrpSpPr/>
+        <p:nvPr/>
+      </p:nvGrpSpPr>
+      <p:grpSpPr>
+        <a:xfrm>
+          <a:off x="0" y="0"/>
+          <a:ext cx="0" cy="0"/>
+          <a:chOff x="0" y="0"/>
+          <a:chExt cx="0" cy="0"/>
+        </a:xfrm>
+      </p:grpSpPr>
+      <p:sp>
+        <p:nvSpPr>
+          <p:cNvPr id="3" name="Titel 2">
+            <a:extLst>
+              <a:ext uri="{FF2B5EF4-FFF2-40B4-BE49-F238E27FC236}">
+                <a16:creationId xmlns:a16="http://schemas.microsoft.com/office/drawing/2014/main" id="{587FF265-404D-351E-E5D6-4239DAF5C502}"/>
+              </a:ext>
+            </a:extLst>
+          </p:cNvPr>
+          <p:cNvSpPr>
+            <a:spLocks noGrp="1"/>
+          </p:cNvSpPr>
+          <p:nvPr>
+            <p:ph type="title"/>
+          </p:nvPr>
+        </p:nvSpPr>
+        <p:spPr/>
+        <p:txBody>
+          <a:bodyPr/>
+          <a:lstStyle/>
+          <a:p>
+            <a:endParaRPr lang="nl-NL"/>
+          </a:p>
+        </p:txBody>
+      </p:sp>
+      <p:sp>
+        <p:nvSpPr>
+          <p:cNvPr id="4" name="Tijdelijke aanduiding voor tekst 3">
+            <a:extLst>
+              <a:ext uri="{FF2B5EF4-FFF2-40B4-BE49-F238E27FC236}">
+                <a16:creationId xmlns:a16="http://schemas.microsoft.com/office/drawing/2014/main" id="{2978A9D4-6692-AAA8-E53E-BE0841B97D80}"/>
+              </a:ext>
+            </a:extLst>
+          </p:cNvPr>
+          <p:cNvSpPr>
+            <a:spLocks noGrp="1"/>
+          </p:cNvSpPr>
+          <p:nvPr>
+            <p:ph type="body" sz="quarter" idx="11"/>
+          </p:nvPr>
+        </p:nvSpPr>
+        <p:spPr/>
+        <p:txBody>
+          <a:bodyPr/>
+          <a:lstStyle/>
+          <a:p>
+            <a:r>
+              <a:rPr lang="en-GB" dirty="0"/>
+              <a:t>Lay the cards on “project thinking” and Product thinking”  on the floor </a:t>
+            </a:r>
+            <a:r>
+              <a:rPr lang="en-GB" dirty="0" err="1"/>
+              <a:t>horizontaly</a:t>
+            </a:r>
+            <a:r>
+              <a:rPr lang="en-GB" dirty="0"/>
+              <a:t>.</a:t>
+            </a:r>
+          </a:p>
+          <a:p>
+            <a:r>
+              <a:rPr lang="en-GB" dirty="0"/>
+              <a:t>Lay the other orange cards vertically to create a table</a:t>
+            </a:r>
+          </a:p>
+          <a:p>
+            <a:r>
+              <a:rPr lang="en-GB" dirty="0"/>
+              <a:t>Shuffle the rest of the cards</a:t>
+            </a:r>
+          </a:p>
+          <a:p>
+            <a:r>
+              <a:rPr lang="en-GB" dirty="0"/>
+              <a:t>Explain the exercise and hand the shuffled cards to the participants and ask them to put it in the right column (project or product thinking)</a:t>
+            </a:r>
+          </a:p>
+          <a:p>
+            <a:r>
+              <a:rPr lang="en-GB" dirty="0"/>
+              <a:t>Debrief and put the cards in the right positions and discuss them</a:t>
+            </a:r>
+          </a:p>
+          <a:p>
+            <a:endParaRPr lang="en-GB" dirty="0"/>
+          </a:p>
+          <a:p>
+            <a:pPr marL="0" indent="0">
+              <a:buNone/>
+            </a:pPr>
+            <a:endParaRPr lang="nl-NL" dirty="0"/>
+          </a:p>
+        </p:txBody>
+      </p:sp>
+      <p:sp>
+        <p:nvSpPr>
+          <p:cNvPr id="6" name="Tijdelijke aanduiding voor tekst 5">
+            <a:extLst>
+              <a:ext uri="{FF2B5EF4-FFF2-40B4-BE49-F238E27FC236}">
+                <a16:creationId xmlns:a16="http://schemas.microsoft.com/office/drawing/2014/main" id="{E1A6E225-D260-0BE3-3869-AC33414D2B61}"/>
+              </a:ext>
+            </a:extLst>
+          </p:cNvPr>
+          <p:cNvSpPr>
+            <a:spLocks noGrp="1"/>
+          </p:cNvSpPr>
+          <p:nvPr>
+            <p:ph type="body" sz="quarter" idx="13"/>
+          </p:nvPr>
+        </p:nvSpPr>
+        <p:spPr/>
+        <p:txBody>
+          <a:bodyPr/>
+          <a:lstStyle/>
+          <a:p>
+            <a:r>
+              <a:rPr lang="en-GB" dirty="0"/>
+              <a:t>By playing this game, you visual the discussion of what makes project thinking different from project thinking. There is no good or bad. Value of this game is having the discussion on how product thinking can be more effective in delivering value in a complex domain.</a:t>
+            </a:r>
+            <a:endParaRPr lang="nl-NL" dirty="0"/>
+          </a:p>
+        </p:txBody>
+      </p:sp>
+      <p:sp>
+        <p:nvSpPr>
+          <p:cNvPr id="2" name="Tijdelijke aanduiding voor voettekst 1">
+            <a:extLst>
+              <a:ext uri="{FF2B5EF4-FFF2-40B4-BE49-F238E27FC236}">
+                <a16:creationId xmlns:a16="http://schemas.microsoft.com/office/drawing/2014/main" id="{150150AD-7979-B393-B6AC-EBE26F8B3E94}"/>
+              </a:ext>
+            </a:extLst>
+          </p:cNvPr>
+          <p:cNvSpPr>
+            <a:spLocks noGrp="1"/>
+          </p:cNvSpPr>
+          <p:nvPr>
+            <p:ph type="ftr" sz="quarter" idx="3"/>
+          </p:nvPr>
+        </p:nvSpPr>
+        <p:spPr/>
+        <p:txBody>
+          <a:bodyPr/>
+          <a:lstStyle/>
+          <a:p>
+            <a:r>
+              <a:rPr lang="en-GB"/>
+              <a:t>1.1</a:t>
+            </a:r>
+            <a:endParaRPr lang="en-NL"/>
+          </a:p>
+        </p:txBody>
+      </p:sp>
+    </p:spTree>
+    <p:extLst>
+      <p:ext uri="{BB962C8B-B14F-4D97-AF65-F5344CB8AC3E}">
+        <p14:creationId xmlns:p14="http://schemas.microsoft.com/office/powerpoint/2010/main" val="669202567"/>
+      </p:ext>
+    </p:extLst>
+  </p:cSld>
+  <p:clrMapOvr>
+    <a:masterClrMapping/>
+  </p:clrMapOvr>
+</p:sld>
+</file>
+
+<file path=ppt/slides/slide30.xml><?xml version="1.0" encoding="utf-8"?>
+<p:sld xmlns:a="http://schemas.openxmlformats.org/drawingml/2006/main" xmlns:r="http://schemas.openxmlformats.org/officeDocument/2006/relationships" xmlns:p="http://schemas.openxmlformats.org/presentationml/2006/main">
+  <p:cSld>
+    <p:spTree>
+      <p:nvGrpSpPr>
+        <p:cNvPr id="1" name=""/>
+        <p:cNvGrpSpPr/>
+        <p:nvPr/>
+      </p:nvGrpSpPr>
+      <p:grpSpPr>
+        <a:xfrm>
+          <a:off x="0" y="0"/>
+          <a:ext cx="0" cy="0"/>
+          <a:chOff x="0" y="0"/>
+          <a:chExt cx="0" cy="0"/>
+        </a:xfrm>
+      </p:grpSpPr>
+      <p:sp>
+        <p:nvSpPr>
+          <p:cNvPr id="2" name="Tijdelijke aanduiding voor voettekst 1">
+            <a:extLst>
+              <a:ext uri="{FF2B5EF4-FFF2-40B4-BE49-F238E27FC236}">
+                <a16:creationId xmlns:a16="http://schemas.microsoft.com/office/drawing/2014/main" id="{E1B86FFD-6927-8AA9-41F7-0AA541198A36}"/>
+              </a:ext>
+            </a:extLst>
+          </p:cNvPr>
+          <p:cNvSpPr>
+            <a:spLocks noGrp="1"/>
+          </p:cNvSpPr>
+          <p:nvPr>
+            <p:ph type="ftr" sz="quarter" idx="11"/>
+          </p:nvPr>
+        </p:nvSpPr>
+        <p:spPr/>
+        <p:txBody>
+          <a:bodyPr/>
+          <a:lstStyle/>
+          <a:p>
+            <a:r>
+              <a:rPr lang="en-GB"/>
+              <a:t>1.1</a:t>
+            </a:r>
+            <a:endParaRPr lang="en-NL"/>
+          </a:p>
+        </p:txBody>
+      </p:sp>
+    </p:spTree>
+    <p:extLst>
+      <p:ext uri="{BB962C8B-B14F-4D97-AF65-F5344CB8AC3E}">
+        <p14:creationId xmlns:p14="http://schemas.microsoft.com/office/powerpoint/2010/main" val="219498674"/>
+      </p:ext>
+    </p:extLst>
+  </p:cSld>
+  <p:clrMapOvr>
+    <a:masterClrMapping/>
+  </p:clrMapOvr>
+</p:sld>
+</file>
+
+<file path=ppt/slides/slide31.xml><?xml version="1.0" encoding="utf-8"?>
+<p:sld xmlns:a="http://schemas.openxmlformats.org/drawingml/2006/main" xmlns:r="http://schemas.openxmlformats.org/officeDocument/2006/relationships" xmlns:p="http://schemas.openxmlformats.org/presentationml/2006/main">
+  <p:cSld>
+    <p:spTree>
+      <p:nvGrpSpPr>
+        <p:cNvPr id="1" name=""/>
+        <p:cNvGrpSpPr/>
+        <p:nvPr/>
+      </p:nvGrpSpPr>
+      <p:grpSpPr>
+        <a:xfrm>
+          <a:off x="0" y="0"/>
+          <a:ext cx="0" cy="0"/>
+          <a:chOff x="0" y="0"/>
+          <a:chExt cx="0" cy="0"/>
+        </a:xfrm>
+      </p:grpSpPr>
+      <p:sp>
+        <p:nvSpPr>
+          <p:cNvPr id="3" name="Tijdelijke aanduiding voor tekst 2">
+            <a:extLst>
+              <a:ext uri="{FF2B5EF4-FFF2-40B4-BE49-F238E27FC236}">
+                <a16:creationId xmlns:a16="http://schemas.microsoft.com/office/drawing/2014/main" id="{33AF8EE4-6F54-DEFE-4B87-24556EF59A54}"/>
+              </a:ext>
+            </a:extLst>
+          </p:cNvPr>
+          <p:cNvSpPr>
+            <a:spLocks noGrp="1"/>
+          </p:cNvSpPr>
+          <p:nvPr>
+            <p:ph type="body" sz="quarter" idx="12"/>
+          </p:nvPr>
+        </p:nvSpPr>
+        <p:spPr/>
+        <p:txBody>
+          <a:bodyPr/>
+          <a:lstStyle/>
+          <a:p>
+            <a:r>
+              <a:rPr lang="en-NL" sz="8800" dirty="0">
+                <a:latin typeface="American Captain" pitchFamily="2" charset="77"/>
+              </a:rPr>
+              <a:t>Upfront analysis</a:t>
+            </a:r>
+            <a:endParaRPr lang="nl-NL" sz="8000" dirty="0"/>
+          </a:p>
+        </p:txBody>
+      </p:sp>
+    </p:spTree>
+    <p:extLst>
+      <p:ext uri="{BB962C8B-B14F-4D97-AF65-F5344CB8AC3E}">
+        <p14:creationId xmlns:p14="http://schemas.microsoft.com/office/powerpoint/2010/main" val="3758910535"/>
+      </p:ext>
+    </p:extLst>
+  </p:cSld>
+  <p:clrMapOvr>
+    <a:masterClrMapping/>
+  </p:clrMapOvr>
+</p:sld>
+</file>
+
+<file path=ppt/slides/slide32.xml><?xml version="1.0" encoding="utf-8"?>
+<p:sld xmlns:a="http://schemas.openxmlformats.org/drawingml/2006/main" xmlns:r="http://schemas.openxmlformats.org/officeDocument/2006/relationships" xmlns:p="http://schemas.openxmlformats.org/presentationml/2006/main">
+  <p:cSld>
+    <p:spTree>
+      <p:nvGrpSpPr>
+        <p:cNvPr id="1" name=""/>
+        <p:cNvGrpSpPr/>
+        <p:nvPr/>
+      </p:nvGrpSpPr>
+      <p:grpSpPr>
+        <a:xfrm>
+          <a:off x="0" y="0"/>
+          <a:ext cx="0" cy="0"/>
+          <a:chOff x="0" y="0"/>
+          <a:chExt cx="0" cy="0"/>
+        </a:xfrm>
+      </p:grpSpPr>
+      <p:sp>
+        <p:nvSpPr>
+          <p:cNvPr id="2" name="Tijdelijke aanduiding voor voettekst 1">
+            <a:extLst>
+              <a:ext uri="{FF2B5EF4-FFF2-40B4-BE49-F238E27FC236}">
+                <a16:creationId xmlns:a16="http://schemas.microsoft.com/office/drawing/2014/main" id="{E1B86FFD-6927-8AA9-41F7-0AA541198A36}"/>
+              </a:ext>
+            </a:extLst>
+          </p:cNvPr>
+          <p:cNvSpPr>
+            <a:spLocks noGrp="1"/>
+          </p:cNvSpPr>
+          <p:nvPr>
+            <p:ph type="ftr" sz="quarter" idx="11"/>
+          </p:nvPr>
+        </p:nvSpPr>
+        <p:spPr/>
+        <p:txBody>
+          <a:bodyPr/>
+          <a:lstStyle/>
+          <a:p>
+            <a:r>
+              <a:rPr lang="en-GB"/>
+              <a:t>1.1</a:t>
+            </a:r>
+            <a:endParaRPr lang="en-NL"/>
+          </a:p>
+        </p:txBody>
+      </p:sp>
+    </p:spTree>
+    <p:extLst>
+      <p:ext uri="{BB962C8B-B14F-4D97-AF65-F5344CB8AC3E}">
+        <p14:creationId xmlns:p14="http://schemas.microsoft.com/office/powerpoint/2010/main" val="185723204"/>
+      </p:ext>
+    </p:extLst>
+  </p:cSld>
+  <p:clrMapOvr>
+    <a:masterClrMapping/>
+  </p:clrMapOvr>
+</p:sld>
+</file>
+
+<file path=ppt/slides/slide33.xml><?xml version="1.0" encoding="utf-8"?>
+<p:sld xmlns:a="http://schemas.openxmlformats.org/drawingml/2006/main" xmlns:r="http://schemas.openxmlformats.org/officeDocument/2006/relationships" xmlns:p="http://schemas.openxmlformats.org/presentationml/2006/main">
+  <p:cSld>
+    <p:spTree>
+      <p:nvGrpSpPr>
+        <p:cNvPr id="1" name=""/>
+        <p:cNvGrpSpPr/>
+        <p:nvPr/>
+      </p:nvGrpSpPr>
+      <p:grpSpPr>
+        <a:xfrm>
+          <a:off x="0" y="0"/>
+          <a:ext cx="0" cy="0"/>
+          <a:chOff x="0" y="0"/>
+          <a:chExt cx="0" cy="0"/>
+        </a:xfrm>
+      </p:grpSpPr>
+      <p:sp>
+        <p:nvSpPr>
+          <p:cNvPr id="3" name="Tijdelijke aanduiding voor tekst 2">
+            <a:extLst>
+              <a:ext uri="{FF2B5EF4-FFF2-40B4-BE49-F238E27FC236}">
+                <a16:creationId xmlns:a16="http://schemas.microsoft.com/office/drawing/2014/main" id="{C8F3C1BE-E159-A4F5-B651-E46CFB437A67}"/>
+              </a:ext>
+            </a:extLst>
+          </p:cNvPr>
+          <p:cNvSpPr>
+            <a:spLocks noGrp="1"/>
+          </p:cNvSpPr>
+          <p:nvPr>
+            <p:ph type="body" sz="quarter" idx="12"/>
+          </p:nvPr>
+        </p:nvSpPr>
+        <p:spPr/>
+        <p:txBody>
+          <a:bodyPr/>
+          <a:lstStyle/>
+          <a:p>
+            <a:r>
+              <a:rPr lang="en-NL" sz="8800" dirty="0">
+                <a:latin typeface="American Captain" pitchFamily="2" charset="77"/>
+              </a:rPr>
+              <a:t>Just-in-time</a:t>
+            </a:r>
+            <a:r>
+              <a:rPr lang="nl-NL" sz="8800" dirty="0">
+                <a:latin typeface="American Captain" pitchFamily="2" charset="77"/>
+              </a:rPr>
+              <a:t> </a:t>
+            </a:r>
+            <a:r>
+              <a:rPr lang="en-NL" sz="8800" dirty="0">
+                <a:latin typeface="American Captain" pitchFamily="2" charset="77"/>
+              </a:rPr>
+              <a:t>resolution</a:t>
+            </a:r>
+            <a:endParaRPr lang="nl-NL" sz="8000" dirty="0"/>
+          </a:p>
+        </p:txBody>
+      </p:sp>
+    </p:spTree>
+    <p:extLst>
+      <p:ext uri="{BB962C8B-B14F-4D97-AF65-F5344CB8AC3E}">
+        <p14:creationId xmlns:p14="http://schemas.microsoft.com/office/powerpoint/2010/main" val="1767558030"/>
+      </p:ext>
+    </p:extLst>
+  </p:cSld>
+  <p:clrMapOvr>
+    <a:masterClrMapping/>
+  </p:clrMapOvr>
+</p:sld>
+</file>
+
+<file path=ppt/slides/slide34.xml><?xml version="1.0" encoding="utf-8"?>
+<p:sld xmlns:a="http://schemas.openxmlformats.org/drawingml/2006/main" xmlns:r="http://schemas.openxmlformats.org/officeDocument/2006/relationships" xmlns:p="http://schemas.openxmlformats.org/presentationml/2006/main">
+  <p:cSld>
+    <p:spTree>
+      <p:nvGrpSpPr>
+        <p:cNvPr id="1" name=""/>
+        <p:cNvGrpSpPr/>
+        <p:nvPr/>
+      </p:nvGrpSpPr>
+      <p:grpSpPr>
+        <a:xfrm>
+          <a:off x="0" y="0"/>
+          <a:ext cx="0" cy="0"/>
+          <a:chOff x="0" y="0"/>
+          <a:chExt cx="0" cy="0"/>
+        </a:xfrm>
+      </p:grpSpPr>
+      <p:sp>
+        <p:nvSpPr>
+          <p:cNvPr id="2" name="Tijdelijke aanduiding voor voettekst 1">
+            <a:extLst>
+              <a:ext uri="{FF2B5EF4-FFF2-40B4-BE49-F238E27FC236}">
+                <a16:creationId xmlns:a16="http://schemas.microsoft.com/office/drawing/2014/main" id="{E1B86FFD-6927-8AA9-41F7-0AA541198A36}"/>
+              </a:ext>
+            </a:extLst>
+          </p:cNvPr>
+          <p:cNvSpPr>
+            <a:spLocks noGrp="1"/>
+          </p:cNvSpPr>
+          <p:nvPr>
+            <p:ph type="ftr" sz="quarter" idx="11"/>
+          </p:nvPr>
+        </p:nvSpPr>
+        <p:spPr/>
+        <p:txBody>
+          <a:bodyPr/>
+          <a:lstStyle/>
+          <a:p>
+            <a:r>
+              <a:rPr lang="en-GB"/>
+              <a:t>1.1</a:t>
+            </a:r>
+            <a:endParaRPr lang="en-NL"/>
+          </a:p>
+        </p:txBody>
+      </p:sp>
+    </p:spTree>
+    <p:extLst>
+      <p:ext uri="{BB962C8B-B14F-4D97-AF65-F5344CB8AC3E}">
+        <p14:creationId xmlns:p14="http://schemas.microsoft.com/office/powerpoint/2010/main" val="365145281"/>
+      </p:ext>
+    </p:extLst>
+  </p:cSld>
+  <p:clrMapOvr>
+    <a:masterClrMapping/>
+  </p:clrMapOvr>
+</p:sld>
+</file>
+
+<file path=ppt/slides/slide35.xml><?xml version="1.0" encoding="utf-8"?>
+<p:sld xmlns:a="http://schemas.openxmlformats.org/drawingml/2006/main" xmlns:r="http://schemas.openxmlformats.org/officeDocument/2006/relationships" xmlns:p="http://schemas.openxmlformats.org/presentationml/2006/main">
+  <p:cSld>
+    <p:spTree>
+      <p:nvGrpSpPr>
+        <p:cNvPr id="1" name=""/>
+        <p:cNvGrpSpPr/>
+        <p:nvPr/>
+      </p:nvGrpSpPr>
+      <p:grpSpPr>
+        <a:xfrm>
+          <a:off x="0" y="0"/>
+          <a:ext cx="0" cy="0"/>
+          <a:chOff x="0" y="0"/>
+          <a:chExt cx="0" cy="0"/>
+        </a:xfrm>
+      </p:grpSpPr>
+      <p:sp>
+        <p:nvSpPr>
+          <p:cNvPr id="3" name="Tijdelijke aanduiding voor tekst 2">
+            <a:extLst>
+              <a:ext uri="{FF2B5EF4-FFF2-40B4-BE49-F238E27FC236}">
+                <a16:creationId xmlns:a16="http://schemas.microsoft.com/office/drawing/2014/main" id="{2BB4E071-6FB3-8CFF-2E19-CB6A92324F8A}"/>
+              </a:ext>
+            </a:extLst>
+          </p:cNvPr>
+          <p:cNvSpPr>
+            <a:spLocks noGrp="1"/>
+          </p:cNvSpPr>
+          <p:nvPr>
+            <p:ph type="body" sz="quarter" idx="12"/>
+          </p:nvPr>
+        </p:nvSpPr>
+        <p:spPr/>
+        <p:txBody>
+          <a:bodyPr/>
+          <a:lstStyle/>
+          <a:p>
+            <a:r>
+              <a:rPr lang="en-NL" sz="8800" dirty="0">
+                <a:latin typeface="American Captain" pitchFamily="2" charset="77"/>
+              </a:rPr>
+              <a:t>Scope,</a:t>
+            </a:r>
+            <a:r>
+              <a:rPr lang="en-GB" sz="8800" dirty="0">
+                <a:latin typeface="American Captain" pitchFamily="2" charset="77"/>
+              </a:rPr>
+              <a:t> </a:t>
+            </a:r>
+            <a:r>
+              <a:rPr lang="en-NL" sz="8800" dirty="0">
+                <a:latin typeface="American Captain" pitchFamily="2" charset="77"/>
+              </a:rPr>
+              <a:t>time &amp; budget</a:t>
+            </a:r>
+            <a:endParaRPr lang="nl-NL" sz="8000" dirty="0"/>
+          </a:p>
+        </p:txBody>
+      </p:sp>
+    </p:spTree>
+    <p:extLst>
+      <p:ext uri="{BB962C8B-B14F-4D97-AF65-F5344CB8AC3E}">
+        <p14:creationId xmlns:p14="http://schemas.microsoft.com/office/powerpoint/2010/main" val="382183876"/>
+      </p:ext>
+    </p:extLst>
+  </p:cSld>
+  <p:clrMapOvr>
+    <a:masterClrMapping/>
+  </p:clrMapOvr>
+</p:sld>
+</file>
+
+<file path=ppt/slides/slide36.xml><?xml version="1.0" encoding="utf-8"?>
+<p:sld xmlns:a="http://schemas.openxmlformats.org/drawingml/2006/main" xmlns:r="http://schemas.openxmlformats.org/officeDocument/2006/relationships" xmlns:p="http://schemas.openxmlformats.org/presentationml/2006/main">
+  <p:cSld>
+    <p:spTree>
+      <p:nvGrpSpPr>
+        <p:cNvPr id="1" name=""/>
+        <p:cNvGrpSpPr/>
+        <p:nvPr/>
+      </p:nvGrpSpPr>
+      <p:grpSpPr>
+        <a:xfrm>
+          <a:off x="0" y="0"/>
+          <a:ext cx="0" cy="0"/>
+          <a:chOff x="0" y="0"/>
+          <a:chExt cx="0" cy="0"/>
+        </a:xfrm>
+      </p:grpSpPr>
+      <p:sp>
+        <p:nvSpPr>
+          <p:cNvPr id="2" name="Tijdelijke aanduiding voor voettekst 1">
+            <a:extLst>
+              <a:ext uri="{FF2B5EF4-FFF2-40B4-BE49-F238E27FC236}">
+                <a16:creationId xmlns:a16="http://schemas.microsoft.com/office/drawing/2014/main" id="{E1B86FFD-6927-8AA9-41F7-0AA541198A36}"/>
+              </a:ext>
+            </a:extLst>
+          </p:cNvPr>
+          <p:cNvSpPr>
+            <a:spLocks noGrp="1"/>
+          </p:cNvSpPr>
+          <p:nvPr>
+            <p:ph type="ftr" sz="quarter" idx="11"/>
+          </p:nvPr>
+        </p:nvSpPr>
+        <p:spPr/>
+        <p:txBody>
+          <a:bodyPr/>
+          <a:lstStyle/>
+          <a:p>
+            <a:r>
+              <a:rPr lang="en-GB"/>
+              <a:t>1.1</a:t>
             </a:r>
             <a:endParaRPr lang="en-NL"/>
           </a:p>
@@ -16627,7 +17159,7 @@
 </p:sld>
 </file>
 
-<file path=ppt/slides/slide29.xml><?xml version="1.0" encoding="utf-8"?>
+<file path=ppt/slides/slide37.xml><?xml version="1.0" encoding="utf-8"?>
 <p:sld xmlns:a="http://schemas.openxmlformats.org/drawingml/2006/main" xmlns:r="http://schemas.openxmlformats.org/officeDocument/2006/relationships" xmlns:p="http://schemas.openxmlformats.org/presentationml/2006/main">
   <p:cSld>
     <p:spTree>
@@ -16666,12 +17198,12 @@
           <a:lstStyle/>
           <a:p>
             <a:r>
-              <a:rPr lang="en-NL" sz="6000">
+              <a:rPr lang="en-NL" sz="8800" dirty="0">
                 <a:latin typeface="American Captain" pitchFamily="2" charset="77"/>
               </a:rPr>
               <a:t>Customer focus</a:t>
             </a:r>
-            <a:endParaRPr lang="nl-NL" dirty="0"/>
+            <a:endParaRPr lang="nl-NL" sz="8000" dirty="0"/>
           </a:p>
         </p:txBody>
       </p:sp>
@@ -16688,7 +17220,1738 @@
 </p:sld>
 </file>
 
-<file path=ppt/slides/slide3.xml><?xml version="1.0" encoding="utf-8"?>
+<file path=ppt/slides/slide38.xml><?xml version="1.0" encoding="utf-8"?>
+<p:sld xmlns:a="http://schemas.openxmlformats.org/drawingml/2006/main" xmlns:r="http://schemas.openxmlformats.org/officeDocument/2006/relationships" xmlns:p="http://schemas.openxmlformats.org/presentationml/2006/main">
+  <p:cSld>
+    <p:spTree>
+      <p:nvGrpSpPr>
+        <p:cNvPr id="1" name=""/>
+        <p:cNvGrpSpPr/>
+        <p:nvPr/>
+      </p:nvGrpSpPr>
+      <p:grpSpPr>
+        <a:xfrm>
+          <a:off x="0" y="0"/>
+          <a:ext cx="0" cy="0"/>
+          <a:chOff x="0" y="0"/>
+          <a:chExt cx="0" cy="0"/>
+        </a:xfrm>
+      </p:grpSpPr>
+      <p:sp>
+        <p:nvSpPr>
+          <p:cNvPr id="2" name="Tijdelijke aanduiding voor voettekst 1">
+            <a:extLst>
+              <a:ext uri="{FF2B5EF4-FFF2-40B4-BE49-F238E27FC236}">
+                <a16:creationId xmlns:a16="http://schemas.microsoft.com/office/drawing/2014/main" id="{E1B86FFD-6927-8AA9-41F7-0AA541198A36}"/>
+              </a:ext>
+            </a:extLst>
+          </p:cNvPr>
+          <p:cNvSpPr>
+            <a:spLocks noGrp="1"/>
+          </p:cNvSpPr>
+          <p:nvPr>
+            <p:ph type="ftr" sz="quarter" idx="11"/>
+          </p:nvPr>
+        </p:nvSpPr>
+        <p:spPr/>
+        <p:txBody>
+          <a:bodyPr/>
+          <a:lstStyle/>
+          <a:p>
+            <a:r>
+              <a:rPr lang="en-GB"/>
+              <a:t>1.1</a:t>
+            </a:r>
+            <a:endParaRPr lang="en-NL"/>
+          </a:p>
+        </p:txBody>
+      </p:sp>
+    </p:spTree>
+    <p:extLst>
+      <p:ext uri="{BB962C8B-B14F-4D97-AF65-F5344CB8AC3E}">
+        <p14:creationId xmlns:p14="http://schemas.microsoft.com/office/powerpoint/2010/main" val="3961148122"/>
+      </p:ext>
+    </p:extLst>
+  </p:cSld>
+  <p:clrMapOvr>
+    <a:masterClrMapping/>
+  </p:clrMapOvr>
+</p:sld>
+</file>
+
+<file path=ppt/slides/slide39.xml><?xml version="1.0" encoding="utf-8"?>
+<p:sld xmlns:a="http://schemas.openxmlformats.org/drawingml/2006/main" xmlns:r="http://schemas.openxmlformats.org/officeDocument/2006/relationships" xmlns:p="http://schemas.openxmlformats.org/presentationml/2006/main">
+  <p:cSld>
+    <p:spTree>
+      <p:nvGrpSpPr>
+        <p:cNvPr id="1" name=""/>
+        <p:cNvGrpSpPr/>
+        <p:nvPr/>
+      </p:nvGrpSpPr>
+      <p:grpSpPr>
+        <a:xfrm>
+          <a:off x="0" y="0"/>
+          <a:ext cx="0" cy="0"/>
+          <a:chOff x="0" y="0"/>
+          <a:chExt cx="0" cy="0"/>
+        </a:xfrm>
+      </p:grpSpPr>
+      <p:sp>
+        <p:nvSpPr>
+          <p:cNvPr id="3" name="Tijdelijke aanduiding voor tekst 2">
+            <a:extLst>
+              <a:ext uri="{FF2B5EF4-FFF2-40B4-BE49-F238E27FC236}">
+                <a16:creationId xmlns:a16="http://schemas.microsoft.com/office/drawing/2014/main" id="{020FEFFD-AC21-5E43-DC49-B20749D41846}"/>
+              </a:ext>
+            </a:extLst>
+          </p:cNvPr>
+          <p:cNvSpPr>
+            <a:spLocks noGrp="1"/>
+          </p:cNvSpPr>
+          <p:nvPr>
+            <p:ph type="body" sz="quarter" idx="12"/>
+          </p:nvPr>
+        </p:nvSpPr>
+        <p:spPr/>
+        <p:txBody>
+          <a:bodyPr/>
+          <a:lstStyle/>
+          <a:p>
+            <a:r>
+              <a:rPr lang="en-NL" sz="8800" dirty="0">
+                <a:latin typeface="American Captain" pitchFamily="2" charset="77"/>
+              </a:rPr>
+              <a:t>Output driven</a:t>
+            </a:r>
+            <a:endParaRPr lang="nl-NL" sz="8000" dirty="0"/>
+          </a:p>
+        </p:txBody>
+      </p:sp>
+    </p:spTree>
+    <p:extLst>
+      <p:ext uri="{BB962C8B-B14F-4D97-AF65-F5344CB8AC3E}">
+        <p14:creationId xmlns:p14="http://schemas.microsoft.com/office/powerpoint/2010/main" val="443291172"/>
+      </p:ext>
+    </p:extLst>
+  </p:cSld>
+  <p:clrMapOvr>
+    <a:masterClrMapping/>
+  </p:clrMapOvr>
+</p:sld>
+</file>
+
+<file path=ppt/slides/slide4.xml><?xml version="1.0" encoding="utf-8"?>
+<p:sld xmlns:a="http://schemas.openxmlformats.org/drawingml/2006/main" xmlns:r="http://schemas.openxmlformats.org/officeDocument/2006/relationships" xmlns:p="http://schemas.openxmlformats.org/presentationml/2006/main">
+  <p:cSld>
+    <p:spTree>
+      <p:nvGrpSpPr>
+        <p:cNvPr id="1" name=""/>
+        <p:cNvGrpSpPr/>
+        <p:nvPr/>
+      </p:nvGrpSpPr>
+      <p:grpSpPr>
+        <a:xfrm>
+          <a:off x="0" y="0"/>
+          <a:ext cx="0" cy="0"/>
+          <a:chOff x="0" y="0"/>
+          <a:chExt cx="0" cy="0"/>
+        </a:xfrm>
+      </p:grpSpPr>
+      <p:sp>
+        <p:nvSpPr>
+          <p:cNvPr id="2" name="Tijdelijke aanduiding voor voettekst 1">
+            <a:extLst>
+              <a:ext uri="{FF2B5EF4-FFF2-40B4-BE49-F238E27FC236}">
+                <a16:creationId xmlns:a16="http://schemas.microsoft.com/office/drawing/2014/main" id="{03ACDC0D-A143-7EDC-7637-F1E87227B39C}"/>
+              </a:ext>
+            </a:extLst>
+          </p:cNvPr>
+          <p:cNvSpPr>
+            <a:spLocks noGrp="1"/>
+          </p:cNvSpPr>
+          <p:nvPr>
+            <p:ph type="ftr" sz="quarter" idx="11"/>
+          </p:nvPr>
+        </p:nvSpPr>
+        <p:spPr/>
+        <p:txBody>
+          <a:bodyPr/>
+          <a:lstStyle/>
+          <a:p>
+            <a:r>
+              <a:rPr lang="en-GB"/>
+              <a:t>1.1</a:t>
+            </a:r>
+            <a:endParaRPr lang="en-NL"/>
+          </a:p>
+        </p:txBody>
+      </p:sp>
+    </p:spTree>
+    <p:extLst>
+      <p:ext uri="{BB962C8B-B14F-4D97-AF65-F5344CB8AC3E}">
+        <p14:creationId xmlns:p14="http://schemas.microsoft.com/office/powerpoint/2010/main" val="1652535429"/>
+      </p:ext>
+    </p:extLst>
+  </p:cSld>
+  <p:clrMapOvr>
+    <a:masterClrMapping/>
+  </p:clrMapOvr>
+</p:sld>
+</file>
+
+<file path=ppt/slides/slide40.xml><?xml version="1.0" encoding="utf-8"?>
+<p:sld xmlns:a="http://schemas.openxmlformats.org/drawingml/2006/main" xmlns:r="http://schemas.openxmlformats.org/officeDocument/2006/relationships" xmlns:p="http://schemas.openxmlformats.org/presentationml/2006/main">
+  <p:cSld>
+    <p:spTree>
+      <p:nvGrpSpPr>
+        <p:cNvPr id="1" name=""/>
+        <p:cNvGrpSpPr/>
+        <p:nvPr/>
+      </p:nvGrpSpPr>
+      <p:grpSpPr>
+        <a:xfrm>
+          <a:off x="0" y="0"/>
+          <a:ext cx="0" cy="0"/>
+          <a:chOff x="0" y="0"/>
+          <a:chExt cx="0" cy="0"/>
+        </a:xfrm>
+      </p:grpSpPr>
+      <p:sp>
+        <p:nvSpPr>
+          <p:cNvPr id="2" name="Tijdelijke aanduiding voor voettekst 1">
+            <a:extLst>
+              <a:ext uri="{FF2B5EF4-FFF2-40B4-BE49-F238E27FC236}">
+                <a16:creationId xmlns:a16="http://schemas.microsoft.com/office/drawing/2014/main" id="{E1B86FFD-6927-8AA9-41F7-0AA541198A36}"/>
+              </a:ext>
+            </a:extLst>
+          </p:cNvPr>
+          <p:cNvSpPr>
+            <a:spLocks noGrp="1"/>
+          </p:cNvSpPr>
+          <p:nvPr>
+            <p:ph type="ftr" sz="quarter" idx="11"/>
+          </p:nvPr>
+        </p:nvSpPr>
+        <p:spPr/>
+        <p:txBody>
+          <a:bodyPr/>
+          <a:lstStyle/>
+          <a:p>
+            <a:r>
+              <a:rPr lang="en-GB"/>
+              <a:t>1.1</a:t>
+            </a:r>
+            <a:endParaRPr lang="en-NL"/>
+          </a:p>
+        </p:txBody>
+      </p:sp>
+    </p:spTree>
+    <p:extLst>
+      <p:ext uri="{BB962C8B-B14F-4D97-AF65-F5344CB8AC3E}">
+        <p14:creationId xmlns:p14="http://schemas.microsoft.com/office/powerpoint/2010/main" val="485861662"/>
+      </p:ext>
+    </p:extLst>
+  </p:cSld>
+  <p:clrMapOvr>
+    <a:masterClrMapping/>
+  </p:clrMapOvr>
+</p:sld>
+</file>
+
+<file path=ppt/slides/slide41.xml><?xml version="1.0" encoding="utf-8"?>
+<p:sld xmlns:a="http://schemas.openxmlformats.org/drawingml/2006/main" xmlns:r="http://schemas.openxmlformats.org/officeDocument/2006/relationships" xmlns:p="http://schemas.openxmlformats.org/presentationml/2006/main">
+  <p:cSld>
+    <p:spTree>
+      <p:nvGrpSpPr>
+        <p:cNvPr id="1" name=""/>
+        <p:cNvGrpSpPr/>
+        <p:nvPr/>
+      </p:nvGrpSpPr>
+      <p:grpSpPr>
+        <a:xfrm>
+          <a:off x="0" y="0"/>
+          <a:ext cx="0" cy="0"/>
+          <a:chOff x="0" y="0"/>
+          <a:chExt cx="0" cy="0"/>
+        </a:xfrm>
+      </p:grpSpPr>
+      <p:sp>
+        <p:nvSpPr>
+          <p:cNvPr id="3" name="Tijdelijke aanduiding voor tekst 2">
+            <a:extLst>
+              <a:ext uri="{FF2B5EF4-FFF2-40B4-BE49-F238E27FC236}">
+                <a16:creationId xmlns:a16="http://schemas.microsoft.com/office/drawing/2014/main" id="{894A383D-31A2-EBA8-D4E5-C96B0AF092A5}"/>
+              </a:ext>
+            </a:extLst>
+          </p:cNvPr>
+          <p:cNvSpPr>
+            <a:spLocks noGrp="1"/>
+          </p:cNvSpPr>
+          <p:nvPr>
+            <p:ph type="body" sz="quarter" idx="12"/>
+          </p:nvPr>
+        </p:nvSpPr>
+        <p:spPr/>
+        <p:txBody>
+          <a:bodyPr/>
+          <a:lstStyle/>
+          <a:p>
+            <a:r>
+              <a:rPr lang="en-NL" sz="8800" dirty="0">
+                <a:latin typeface="American Captain" pitchFamily="2" charset="77"/>
+              </a:rPr>
+              <a:t>Outcome driven</a:t>
+            </a:r>
+            <a:endParaRPr lang="nl-NL" sz="8000" dirty="0"/>
+          </a:p>
+        </p:txBody>
+      </p:sp>
+    </p:spTree>
+    <p:extLst>
+      <p:ext uri="{BB962C8B-B14F-4D97-AF65-F5344CB8AC3E}">
+        <p14:creationId xmlns:p14="http://schemas.microsoft.com/office/powerpoint/2010/main" val="100569236"/>
+      </p:ext>
+    </p:extLst>
+  </p:cSld>
+  <p:clrMapOvr>
+    <a:masterClrMapping/>
+  </p:clrMapOvr>
+</p:sld>
+</file>
+
+<file path=ppt/slides/slide42.xml><?xml version="1.0" encoding="utf-8"?>
+<p:sld xmlns:a="http://schemas.openxmlformats.org/drawingml/2006/main" xmlns:r="http://schemas.openxmlformats.org/officeDocument/2006/relationships" xmlns:p="http://schemas.openxmlformats.org/presentationml/2006/main">
+  <p:cSld>
+    <p:spTree>
+      <p:nvGrpSpPr>
+        <p:cNvPr id="1" name=""/>
+        <p:cNvGrpSpPr/>
+        <p:nvPr/>
+      </p:nvGrpSpPr>
+      <p:grpSpPr>
+        <a:xfrm>
+          <a:off x="0" y="0"/>
+          <a:ext cx="0" cy="0"/>
+          <a:chOff x="0" y="0"/>
+          <a:chExt cx="0" cy="0"/>
+        </a:xfrm>
+      </p:grpSpPr>
+      <p:sp>
+        <p:nvSpPr>
+          <p:cNvPr id="2" name="Tijdelijke aanduiding voor voettekst 1">
+            <a:extLst>
+              <a:ext uri="{FF2B5EF4-FFF2-40B4-BE49-F238E27FC236}">
+                <a16:creationId xmlns:a16="http://schemas.microsoft.com/office/drawing/2014/main" id="{E1B86FFD-6927-8AA9-41F7-0AA541198A36}"/>
+              </a:ext>
+            </a:extLst>
+          </p:cNvPr>
+          <p:cNvSpPr>
+            <a:spLocks noGrp="1"/>
+          </p:cNvSpPr>
+          <p:nvPr>
+            <p:ph type="ftr" sz="quarter" idx="11"/>
+          </p:nvPr>
+        </p:nvSpPr>
+        <p:spPr/>
+        <p:txBody>
+          <a:bodyPr/>
+          <a:lstStyle/>
+          <a:p>
+            <a:r>
+              <a:rPr lang="en-GB"/>
+              <a:t>1.1</a:t>
+            </a:r>
+            <a:endParaRPr lang="en-NL"/>
+          </a:p>
+        </p:txBody>
+      </p:sp>
+    </p:spTree>
+    <p:extLst>
+      <p:ext uri="{BB962C8B-B14F-4D97-AF65-F5344CB8AC3E}">
+        <p14:creationId xmlns:p14="http://schemas.microsoft.com/office/powerpoint/2010/main" val="3785264099"/>
+      </p:ext>
+    </p:extLst>
+  </p:cSld>
+  <p:clrMapOvr>
+    <a:masterClrMapping/>
+  </p:clrMapOvr>
+</p:sld>
+</file>
+
+<file path=ppt/slides/slide43.xml><?xml version="1.0" encoding="utf-8"?>
+<p:sld xmlns:a="http://schemas.openxmlformats.org/drawingml/2006/main" xmlns:r="http://schemas.openxmlformats.org/officeDocument/2006/relationships" xmlns:p="http://schemas.openxmlformats.org/presentationml/2006/main">
+  <p:cSld>
+    <p:spTree>
+      <p:nvGrpSpPr>
+        <p:cNvPr id="1" name=""/>
+        <p:cNvGrpSpPr/>
+        <p:nvPr/>
+      </p:nvGrpSpPr>
+      <p:grpSpPr>
+        <a:xfrm>
+          <a:off x="0" y="0"/>
+          <a:ext cx="0" cy="0"/>
+          <a:chOff x="0" y="0"/>
+          <a:chExt cx="0" cy="0"/>
+        </a:xfrm>
+      </p:grpSpPr>
+      <p:sp>
+        <p:nvSpPr>
+          <p:cNvPr id="3" name="Tijdelijke aanduiding voor tekst 2">
+            <a:extLst>
+              <a:ext uri="{FF2B5EF4-FFF2-40B4-BE49-F238E27FC236}">
+                <a16:creationId xmlns:a16="http://schemas.microsoft.com/office/drawing/2014/main" id="{7F0B2EC5-85B2-A2B6-2646-6DDCED3FB8DF}"/>
+              </a:ext>
+            </a:extLst>
+          </p:cNvPr>
+          <p:cNvSpPr>
+            <a:spLocks noGrp="1"/>
+          </p:cNvSpPr>
+          <p:nvPr>
+            <p:ph type="body" sz="quarter" idx="12"/>
+          </p:nvPr>
+        </p:nvSpPr>
+        <p:spPr/>
+        <p:txBody>
+          <a:bodyPr/>
+          <a:lstStyle/>
+          <a:p>
+            <a:r>
+              <a:rPr lang="en-GB" sz="8800" dirty="0">
+                <a:latin typeface="American Captain" pitchFamily="2" charset="77"/>
+              </a:rPr>
+              <a:t>Follow</a:t>
+            </a:r>
+            <a:r>
+              <a:rPr lang="en-NL" sz="8800" dirty="0">
+                <a:latin typeface="American Captain" pitchFamily="2" charset="77"/>
+              </a:rPr>
+              <a:t> a plan</a:t>
+            </a:r>
+            <a:endParaRPr lang="nl-NL" sz="8000" dirty="0"/>
+          </a:p>
+        </p:txBody>
+      </p:sp>
+    </p:spTree>
+    <p:extLst>
+      <p:ext uri="{BB962C8B-B14F-4D97-AF65-F5344CB8AC3E}">
+        <p14:creationId xmlns:p14="http://schemas.microsoft.com/office/powerpoint/2010/main" val="754634112"/>
+      </p:ext>
+    </p:extLst>
+  </p:cSld>
+  <p:clrMapOvr>
+    <a:masterClrMapping/>
+  </p:clrMapOvr>
+</p:sld>
+</file>
+
+<file path=ppt/slides/slide44.xml><?xml version="1.0" encoding="utf-8"?>
+<p:sld xmlns:a="http://schemas.openxmlformats.org/drawingml/2006/main" xmlns:r="http://schemas.openxmlformats.org/officeDocument/2006/relationships" xmlns:p="http://schemas.openxmlformats.org/presentationml/2006/main">
+  <p:cSld>
+    <p:spTree>
+      <p:nvGrpSpPr>
+        <p:cNvPr id="1" name=""/>
+        <p:cNvGrpSpPr/>
+        <p:nvPr/>
+      </p:nvGrpSpPr>
+      <p:grpSpPr>
+        <a:xfrm>
+          <a:off x="0" y="0"/>
+          <a:ext cx="0" cy="0"/>
+          <a:chOff x="0" y="0"/>
+          <a:chExt cx="0" cy="0"/>
+        </a:xfrm>
+      </p:grpSpPr>
+      <p:sp>
+        <p:nvSpPr>
+          <p:cNvPr id="2" name="Tijdelijke aanduiding voor voettekst 1">
+            <a:extLst>
+              <a:ext uri="{FF2B5EF4-FFF2-40B4-BE49-F238E27FC236}">
+                <a16:creationId xmlns:a16="http://schemas.microsoft.com/office/drawing/2014/main" id="{E1B86FFD-6927-8AA9-41F7-0AA541198A36}"/>
+              </a:ext>
+            </a:extLst>
+          </p:cNvPr>
+          <p:cNvSpPr>
+            <a:spLocks noGrp="1"/>
+          </p:cNvSpPr>
+          <p:nvPr>
+            <p:ph type="ftr" sz="quarter" idx="11"/>
+          </p:nvPr>
+        </p:nvSpPr>
+        <p:spPr/>
+        <p:txBody>
+          <a:bodyPr/>
+          <a:lstStyle/>
+          <a:p>
+            <a:r>
+              <a:rPr lang="en-GB"/>
+              <a:t>1.1</a:t>
+            </a:r>
+            <a:endParaRPr lang="en-NL"/>
+          </a:p>
+        </p:txBody>
+      </p:sp>
+    </p:spTree>
+    <p:extLst>
+      <p:ext uri="{BB962C8B-B14F-4D97-AF65-F5344CB8AC3E}">
+        <p14:creationId xmlns:p14="http://schemas.microsoft.com/office/powerpoint/2010/main" val="3204729419"/>
+      </p:ext>
+    </p:extLst>
+  </p:cSld>
+  <p:clrMapOvr>
+    <a:masterClrMapping/>
+  </p:clrMapOvr>
+</p:sld>
+</file>
+
+<file path=ppt/slides/slide45.xml><?xml version="1.0" encoding="utf-8"?>
+<p:sld xmlns:a="http://schemas.openxmlformats.org/drawingml/2006/main" xmlns:r="http://schemas.openxmlformats.org/officeDocument/2006/relationships" xmlns:p="http://schemas.openxmlformats.org/presentationml/2006/main">
+  <p:cSld>
+    <p:spTree>
+      <p:nvGrpSpPr>
+        <p:cNvPr id="1" name=""/>
+        <p:cNvGrpSpPr/>
+        <p:nvPr/>
+      </p:nvGrpSpPr>
+      <p:grpSpPr>
+        <a:xfrm>
+          <a:off x="0" y="0"/>
+          <a:ext cx="0" cy="0"/>
+          <a:chOff x="0" y="0"/>
+          <a:chExt cx="0" cy="0"/>
+        </a:xfrm>
+      </p:grpSpPr>
+      <p:sp>
+        <p:nvSpPr>
+          <p:cNvPr id="3" name="Tijdelijke aanduiding voor tekst 2">
+            <a:extLst>
+              <a:ext uri="{FF2B5EF4-FFF2-40B4-BE49-F238E27FC236}">
+                <a16:creationId xmlns:a16="http://schemas.microsoft.com/office/drawing/2014/main" id="{27F561E4-9754-0C87-65B7-7D2FE3CB145C}"/>
+              </a:ext>
+            </a:extLst>
+          </p:cNvPr>
+          <p:cNvSpPr>
+            <a:spLocks noGrp="1"/>
+          </p:cNvSpPr>
+          <p:nvPr>
+            <p:ph type="body" sz="quarter" idx="12"/>
+          </p:nvPr>
+        </p:nvSpPr>
+        <p:spPr/>
+        <p:txBody>
+          <a:bodyPr/>
+          <a:lstStyle/>
+          <a:p>
+            <a:r>
+              <a:rPr lang="en-GB" sz="8800" dirty="0">
+                <a:latin typeface="American Captain" pitchFamily="2" charset="77"/>
+              </a:rPr>
+              <a:t>Inspect &amp; Adapt</a:t>
+            </a:r>
+            <a:endParaRPr lang="nl-NL" sz="8000" dirty="0"/>
+          </a:p>
+        </p:txBody>
+      </p:sp>
+    </p:spTree>
+    <p:extLst>
+      <p:ext uri="{BB962C8B-B14F-4D97-AF65-F5344CB8AC3E}">
+        <p14:creationId xmlns:p14="http://schemas.microsoft.com/office/powerpoint/2010/main" val="1160466600"/>
+      </p:ext>
+    </p:extLst>
+  </p:cSld>
+  <p:clrMapOvr>
+    <a:masterClrMapping/>
+  </p:clrMapOvr>
+</p:sld>
+</file>
+
+<file path=ppt/slides/slide46.xml><?xml version="1.0" encoding="utf-8"?>
+<p:sld xmlns:a="http://schemas.openxmlformats.org/drawingml/2006/main" xmlns:r="http://schemas.openxmlformats.org/officeDocument/2006/relationships" xmlns:p="http://schemas.openxmlformats.org/presentationml/2006/main">
+  <p:cSld>
+    <p:spTree>
+      <p:nvGrpSpPr>
+        <p:cNvPr id="1" name=""/>
+        <p:cNvGrpSpPr/>
+        <p:nvPr/>
+      </p:nvGrpSpPr>
+      <p:grpSpPr>
+        <a:xfrm>
+          <a:off x="0" y="0"/>
+          <a:ext cx="0" cy="0"/>
+          <a:chOff x="0" y="0"/>
+          <a:chExt cx="0" cy="0"/>
+        </a:xfrm>
+      </p:grpSpPr>
+      <p:sp>
+        <p:nvSpPr>
+          <p:cNvPr id="2" name="Tijdelijke aanduiding voor voettekst 1">
+            <a:extLst>
+              <a:ext uri="{FF2B5EF4-FFF2-40B4-BE49-F238E27FC236}">
+                <a16:creationId xmlns:a16="http://schemas.microsoft.com/office/drawing/2014/main" id="{E1B86FFD-6927-8AA9-41F7-0AA541198A36}"/>
+              </a:ext>
+            </a:extLst>
+          </p:cNvPr>
+          <p:cNvSpPr>
+            <a:spLocks noGrp="1"/>
+          </p:cNvSpPr>
+          <p:nvPr>
+            <p:ph type="ftr" sz="quarter" idx="11"/>
+          </p:nvPr>
+        </p:nvSpPr>
+        <p:spPr/>
+        <p:txBody>
+          <a:bodyPr/>
+          <a:lstStyle/>
+          <a:p>
+            <a:r>
+              <a:rPr lang="en-GB"/>
+              <a:t>1.1</a:t>
+            </a:r>
+            <a:endParaRPr lang="en-NL"/>
+          </a:p>
+        </p:txBody>
+      </p:sp>
+    </p:spTree>
+    <p:extLst>
+      <p:ext uri="{BB962C8B-B14F-4D97-AF65-F5344CB8AC3E}">
+        <p14:creationId xmlns:p14="http://schemas.microsoft.com/office/powerpoint/2010/main" val="3533151899"/>
+      </p:ext>
+    </p:extLst>
+  </p:cSld>
+  <p:clrMapOvr>
+    <a:masterClrMapping/>
+  </p:clrMapOvr>
+</p:sld>
+</file>
+
+<file path=ppt/slides/slide5.xml><?xml version="1.0" encoding="utf-8"?>
+<p:sld xmlns:a="http://schemas.openxmlformats.org/drawingml/2006/main" xmlns:r="http://schemas.openxmlformats.org/officeDocument/2006/relationships" xmlns:p="http://schemas.openxmlformats.org/presentationml/2006/main">
+  <p:cSld>
+    <p:spTree>
+      <p:nvGrpSpPr>
+        <p:cNvPr id="1" name=""/>
+        <p:cNvGrpSpPr/>
+        <p:nvPr/>
+      </p:nvGrpSpPr>
+      <p:grpSpPr>
+        <a:xfrm>
+          <a:off x="0" y="0"/>
+          <a:ext cx="0" cy="0"/>
+          <a:chOff x="0" y="0"/>
+          <a:chExt cx="0" cy="0"/>
+        </a:xfrm>
+      </p:grpSpPr>
+      <p:sp>
+        <p:nvSpPr>
+          <p:cNvPr id="30" name="Tijdelijke aanduiding voor tekst 29">
+            <a:extLst>
+              <a:ext uri="{FF2B5EF4-FFF2-40B4-BE49-F238E27FC236}">
+                <a16:creationId xmlns:a16="http://schemas.microsoft.com/office/drawing/2014/main" id="{CC45A6AF-CF23-0AA9-9AE3-0BFF60C847F5}"/>
+              </a:ext>
+            </a:extLst>
+          </p:cNvPr>
+          <p:cNvSpPr>
+            <a:spLocks noGrp="1"/>
+          </p:cNvSpPr>
+          <p:nvPr>
+            <p:ph type="body" sz="quarter" idx="13"/>
+          </p:nvPr>
+        </p:nvSpPr>
+        <p:spPr>
+          <a:xfrm>
+            <a:off x="627064" y="617538"/>
+            <a:ext cx="2889860" cy="4335462"/>
+          </a:xfrm>
+        </p:spPr>
+        <p:txBody>
+          <a:bodyPr anchor="ctr"/>
+          <a:lstStyle/>
+          <a:p>
+            <a:r>
+              <a:rPr lang="en-GB" dirty="0"/>
+              <a:t>Cheat sheet</a:t>
+            </a:r>
+            <a:endParaRPr lang="nl-NL" dirty="0"/>
+          </a:p>
+        </p:txBody>
+      </p:sp>
+      <p:sp>
+        <p:nvSpPr>
+          <p:cNvPr id="10" name="Rechthoek 9">
+            <a:extLst>
+              <a:ext uri="{FF2B5EF4-FFF2-40B4-BE49-F238E27FC236}">
+                <a16:creationId xmlns:a16="http://schemas.microsoft.com/office/drawing/2014/main" id="{CEB03BD0-B3D7-E2D2-2C30-25FE7FD19E53}"/>
+              </a:ext>
+            </a:extLst>
+          </p:cNvPr>
+          <p:cNvSpPr/>
+          <p:nvPr/>
+        </p:nvSpPr>
+        <p:spPr>
+          <a:xfrm>
+            <a:off x="4821849" y="1146516"/>
+            <a:ext cx="773722" cy="389353"/>
+          </a:xfrm>
+          <a:prstGeom prst="rect">
+            <a:avLst/>
+          </a:prstGeom>
+        </p:spPr>
+        <p:style>
+          <a:lnRef idx="2">
+            <a:schemeClr val="accent2">
+              <a:shade val="50000"/>
+            </a:schemeClr>
+          </a:lnRef>
+          <a:fillRef idx="1">
+            <a:schemeClr val="accent2"/>
+          </a:fillRef>
+          <a:effectRef idx="0">
+            <a:schemeClr val="accent2"/>
+          </a:effectRef>
+          <a:fontRef idx="minor">
+            <a:schemeClr val="lt1"/>
+          </a:fontRef>
+        </p:style>
+        <p:txBody>
+          <a:bodyPr rtlCol="0" anchor="ctr"/>
+          <a:lstStyle/>
+          <a:p>
+            <a:pPr algn="ctr"/>
+            <a:r>
+              <a:rPr lang="en-GB" sz="800" dirty="0"/>
+              <a:t>Project Thinking</a:t>
+            </a:r>
+            <a:endParaRPr lang="nl-NL" sz="800" dirty="0"/>
+          </a:p>
+        </p:txBody>
+      </p:sp>
+      <p:sp>
+        <p:nvSpPr>
+          <p:cNvPr id="11" name="Rechthoek 10">
+            <a:extLst>
+              <a:ext uri="{FF2B5EF4-FFF2-40B4-BE49-F238E27FC236}">
+                <a16:creationId xmlns:a16="http://schemas.microsoft.com/office/drawing/2014/main" id="{8C10596A-B8E0-8B97-0893-FADF89BF626A}"/>
+              </a:ext>
+            </a:extLst>
+          </p:cNvPr>
+          <p:cNvSpPr/>
+          <p:nvPr/>
+        </p:nvSpPr>
+        <p:spPr>
+          <a:xfrm>
+            <a:off x="5712803" y="1146516"/>
+            <a:ext cx="773722" cy="389353"/>
+          </a:xfrm>
+          <a:prstGeom prst="rect">
+            <a:avLst/>
+          </a:prstGeom>
+        </p:spPr>
+        <p:style>
+          <a:lnRef idx="2">
+            <a:schemeClr val="accent2">
+              <a:shade val="50000"/>
+            </a:schemeClr>
+          </a:lnRef>
+          <a:fillRef idx="1">
+            <a:schemeClr val="accent2"/>
+          </a:fillRef>
+          <a:effectRef idx="0">
+            <a:schemeClr val="accent2"/>
+          </a:effectRef>
+          <a:fontRef idx="minor">
+            <a:schemeClr val="lt1"/>
+          </a:fontRef>
+        </p:style>
+        <p:txBody>
+          <a:bodyPr rtlCol="0" anchor="ctr"/>
+          <a:lstStyle/>
+          <a:p>
+            <a:pPr algn="ctr"/>
+            <a:r>
+              <a:rPr lang="en-GB" sz="800" dirty="0"/>
+              <a:t>Product Thinking</a:t>
+            </a:r>
+            <a:endParaRPr lang="nl-NL" sz="800" dirty="0"/>
+          </a:p>
+        </p:txBody>
+      </p:sp>
+      <p:sp>
+        <p:nvSpPr>
+          <p:cNvPr id="12" name="Rechthoek 11">
+            <a:extLst>
+              <a:ext uri="{FF2B5EF4-FFF2-40B4-BE49-F238E27FC236}">
+                <a16:creationId xmlns:a16="http://schemas.microsoft.com/office/drawing/2014/main" id="{FEC15AED-DC88-611E-A996-F6A0243020D1}"/>
+              </a:ext>
+            </a:extLst>
+          </p:cNvPr>
+          <p:cNvSpPr/>
+          <p:nvPr/>
+        </p:nvSpPr>
+        <p:spPr>
+          <a:xfrm>
+            <a:off x="3947307" y="1650608"/>
+            <a:ext cx="773722" cy="389353"/>
+          </a:xfrm>
+          <a:prstGeom prst="rect">
+            <a:avLst/>
+          </a:prstGeom>
+        </p:spPr>
+        <p:style>
+          <a:lnRef idx="2">
+            <a:schemeClr val="accent2">
+              <a:shade val="50000"/>
+            </a:schemeClr>
+          </a:lnRef>
+          <a:fillRef idx="1">
+            <a:schemeClr val="accent2"/>
+          </a:fillRef>
+          <a:effectRef idx="0">
+            <a:schemeClr val="accent2"/>
+          </a:effectRef>
+          <a:fontRef idx="minor">
+            <a:schemeClr val="lt1"/>
+          </a:fontRef>
+        </p:style>
+        <p:txBody>
+          <a:bodyPr rtlCol="0" anchor="ctr"/>
+          <a:lstStyle/>
+          <a:p>
+            <a:pPr algn="ctr"/>
+            <a:r>
+              <a:rPr lang="en-GB" sz="800" dirty="0"/>
+              <a:t>Life Cycle</a:t>
+            </a:r>
+            <a:endParaRPr lang="nl-NL" sz="800" dirty="0"/>
+          </a:p>
+        </p:txBody>
+      </p:sp>
+      <p:sp>
+        <p:nvSpPr>
+          <p:cNvPr id="13" name="Rechthoek 12">
+            <a:extLst>
+              <a:ext uri="{FF2B5EF4-FFF2-40B4-BE49-F238E27FC236}">
+                <a16:creationId xmlns:a16="http://schemas.microsoft.com/office/drawing/2014/main" id="{02C545CA-EC3F-1918-0DDD-C2CEDA42FC80}"/>
+              </a:ext>
+            </a:extLst>
+          </p:cNvPr>
+          <p:cNvSpPr/>
+          <p:nvPr/>
+        </p:nvSpPr>
+        <p:spPr>
+          <a:xfrm>
+            <a:off x="3947307" y="2117626"/>
+            <a:ext cx="773722" cy="389353"/>
+          </a:xfrm>
+          <a:prstGeom prst="rect">
+            <a:avLst/>
+          </a:prstGeom>
+        </p:spPr>
+        <p:style>
+          <a:lnRef idx="2">
+            <a:schemeClr val="accent2">
+              <a:shade val="50000"/>
+            </a:schemeClr>
+          </a:lnRef>
+          <a:fillRef idx="1">
+            <a:schemeClr val="accent2"/>
+          </a:fillRef>
+          <a:effectRef idx="0">
+            <a:schemeClr val="accent2"/>
+          </a:effectRef>
+          <a:fontRef idx="minor">
+            <a:schemeClr val="lt1"/>
+          </a:fontRef>
+        </p:style>
+        <p:txBody>
+          <a:bodyPr rtlCol="0" anchor="ctr"/>
+          <a:lstStyle/>
+          <a:p>
+            <a:pPr algn="ctr"/>
+            <a:r>
+              <a:rPr lang="en-GB" sz="800" dirty="0"/>
+              <a:t>Way of working</a:t>
+            </a:r>
+            <a:endParaRPr lang="nl-NL" sz="800" dirty="0"/>
+          </a:p>
+        </p:txBody>
+      </p:sp>
+      <p:sp>
+        <p:nvSpPr>
+          <p:cNvPr id="14" name="Rechthoek 13">
+            <a:extLst>
+              <a:ext uri="{FF2B5EF4-FFF2-40B4-BE49-F238E27FC236}">
+                <a16:creationId xmlns:a16="http://schemas.microsoft.com/office/drawing/2014/main" id="{301C22A6-7DE0-B107-B043-5F7B16EB9841}"/>
+              </a:ext>
+            </a:extLst>
+          </p:cNvPr>
+          <p:cNvSpPr/>
+          <p:nvPr/>
+        </p:nvSpPr>
+        <p:spPr>
+          <a:xfrm>
+            <a:off x="3947307" y="2584644"/>
+            <a:ext cx="773722" cy="389353"/>
+          </a:xfrm>
+          <a:prstGeom prst="rect">
+            <a:avLst/>
+          </a:prstGeom>
+        </p:spPr>
+        <p:style>
+          <a:lnRef idx="2">
+            <a:schemeClr val="accent2">
+              <a:shade val="50000"/>
+            </a:schemeClr>
+          </a:lnRef>
+          <a:fillRef idx="1">
+            <a:schemeClr val="accent2"/>
+          </a:fillRef>
+          <a:effectRef idx="0">
+            <a:schemeClr val="accent2"/>
+          </a:effectRef>
+          <a:fontRef idx="minor">
+            <a:schemeClr val="lt1"/>
+          </a:fontRef>
+        </p:style>
+        <p:txBody>
+          <a:bodyPr rtlCol="0" anchor="ctr"/>
+          <a:lstStyle/>
+          <a:p>
+            <a:pPr algn="ctr"/>
+            <a:r>
+              <a:rPr lang="en-GB" sz="800" dirty="0"/>
+              <a:t>Reduce</a:t>
+            </a:r>
+          </a:p>
+          <a:p>
+            <a:pPr algn="ctr"/>
+            <a:r>
+              <a:rPr lang="en-GB" sz="800" dirty="0"/>
+              <a:t>Risk</a:t>
+            </a:r>
+            <a:endParaRPr lang="nl-NL" sz="800" dirty="0"/>
+          </a:p>
+        </p:txBody>
+      </p:sp>
+      <p:sp>
+        <p:nvSpPr>
+          <p:cNvPr id="15" name="Rechthoek 14">
+            <a:extLst>
+              <a:ext uri="{FF2B5EF4-FFF2-40B4-BE49-F238E27FC236}">
+                <a16:creationId xmlns:a16="http://schemas.microsoft.com/office/drawing/2014/main" id="{0ABB32A3-202D-0D93-3E38-53D31A15742E}"/>
+              </a:ext>
+            </a:extLst>
+          </p:cNvPr>
+          <p:cNvSpPr/>
+          <p:nvPr/>
+        </p:nvSpPr>
+        <p:spPr>
+          <a:xfrm>
+            <a:off x="3947307" y="3051662"/>
+            <a:ext cx="773722" cy="389353"/>
+          </a:xfrm>
+          <a:prstGeom prst="rect">
+            <a:avLst/>
+          </a:prstGeom>
+        </p:spPr>
+        <p:style>
+          <a:lnRef idx="2">
+            <a:schemeClr val="accent2">
+              <a:shade val="50000"/>
+            </a:schemeClr>
+          </a:lnRef>
+          <a:fillRef idx="1">
+            <a:schemeClr val="accent2"/>
+          </a:fillRef>
+          <a:effectRef idx="0">
+            <a:schemeClr val="accent2"/>
+          </a:effectRef>
+          <a:fontRef idx="minor">
+            <a:schemeClr val="lt1"/>
+          </a:fontRef>
+        </p:style>
+        <p:txBody>
+          <a:bodyPr rtlCol="0" anchor="ctr"/>
+          <a:lstStyle/>
+          <a:p>
+            <a:pPr algn="ctr"/>
+            <a:r>
+              <a:rPr lang="en-GB" sz="800" dirty="0"/>
+              <a:t>Focus Area</a:t>
+            </a:r>
+            <a:endParaRPr lang="nl-NL" sz="800" dirty="0"/>
+          </a:p>
+        </p:txBody>
+      </p:sp>
+      <p:sp>
+        <p:nvSpPr>
+          <p:cNvPr id="16" name="Rechthoek 15">
+            <a:extLst>
+              <a:ext uri="{FF2B5EF4-FFF2-40B4-BE49-F238E27FC236}">
+                <a16:creationId xmlns:a16="http://schemas.microsoft.com/office/drawing/2014/main" id="{B5BD8C10-5BC8-A68C-93AE-4DAC91B097BF}"/>
+              </a:ext>
+            </a:extLst>
+          </p:cNvPr>
+          <p:cNvSpPr/>
+          <p:nvPr/>
+        </p:nvSpPr>
+        <p:spPr>
+          <a:xfrm>
+            <a:off x="3947307" y="3518680"/>
+            <a:ext cx="773722" cy="389353"/>
+          </a:xfrm>
+          <a:prstGeom prst="rect">
+            <a:avLst/>
+          </a:prstGeom>
+        </p:spPr>
+        <p:style>
+          <a:lnRef idx="2">
+            <a:schemeClr val="accent2">
+              <a:shade val="50000"/>
+            </a:schemeClr>
+          </a:lnRef>
+          <a:fillRef idx="1">
+            <a:schemeClr val="accent2"/>
+          </a:fillRef>
+          <a:effectRef idx="0">
+            <a:schemeClr val="accent2"/>
+          </a:effectRef>
+          <a:fontRef idx="minor">
+            <a:schemeClr val="lt1"/>
+          </a:fontRef>
+        </p:style>
+        <p:txBody>
+          <a:bodyPr rtlCol="0" anchor="ctr"/>
+          <a:lstStyle/>
+          <a:p>
+            <a:pPr algn="ctr"/>
+            <a:r>
+              <a:rPr lang="en-GB" sz="800" dirty="0"/>
+              <a:t>Governance</a:t>
+            </a:r>
+            <a:endParaRPr lang="nl-NL" sz="800" dirty="0"/>
+          </a:p>
+        </p:txBody>
+      </p:sp>
+      <p:sp>
+        <p:nvSpPr>
+          <p:cNvPr id="17" name="Rechthoek 16">
+            <a:extLst>
+              <a:ext uri="{FF2B5EF4-FFF2-40B4-BE49-F238E27FC236}">
+                <a16:creationId xmlns:a16="http://schemas.microsoft.com/office/drawing/2014/main" id="{B0600500-473C-32DB-B322-2601D1D08DF3}"/>
+              </a:ext>
+            </a:extLst>
+          </p:cNvPr>
+          <p:cNvSpPr/>
+          <p:nvPr/>
+        </p:nvSpPr>
+        <p:spPr>
+          <a:xfrm>
+            <a:off x="3947307" y="3985698"/>
+            <a:ext cx="773722" cy="389353"/>
+          </a:xfrm>
+          <a:prstGeom prst="rect">
+            <a:avLst/>
+          </a:prstGeom>
+        </p:spPr>
+        <p:style>
+          <a:lnRef idx="2">
+            <a:schemeClr val="accent2">
+              <a:shade val="50000"/>
+            </a:schemeClr>
+          </a:lnRef>
+          <a:fillRef idx="1">
+            <a:schemeClr val="accent2"/>
+          </a:fillRef>
+          <a:effectRef idx="0">
+            <a:schemeClr val="accent2"/>
+          </a:effectRef>
+          <a:fontRef idx="minor">
+            <a:schemeClr val="lt1"/>
+          </a:fontRef>
+        </p:style>
+        <p:txBody>
+          <a:bodyPr rtlCol="0" anchor="ctr"/>
+          <a:lstStyle/>
+          <a:p>
+            <a:pPr algn="ctr"/>
+            <a:r>
+              <a:rPr lang="en-GB" sz="800" dirty="0"/>
+              <a:t>Performance</a:t>
+            </a:r>
+            <a:endParaRPr lang="nl-NL" sz="800" dirty="0"/>
+          </a:p>
+        </p:txBody>
+      </p:sp>
+      <p:sp>
+        <p:nvSpPr>
+          <p:cNvPr id="18" name="Rechthoek 17">
+            <a:extLst>
+              <a:ext uri="{FF2B5EF4-FFF2-40B4-BE49-F238E27FC236}">
+                <a16:creationId xmlns:a16="http://schemas.microsoft.com/office/drawing/2014/main" id="{E498665A-4E37-38DC-DB60-8E36CD0E34FB}"/>
+              </a:ext>
+            </a:extLst>
+          </p:cNvPr>
+          <p:cNvSpPr/>
+          <p:nvPr/>
+        </p:nvSpPr>
+        <p:spPr>
+          <a:xfrm>
+            <a:off x="4821848" y="1650608"/>
+            <a:ext cx="773722" cy="389353"/>
+          </a:xfrm>
+          <a:prstGeom prst="rect">
+            <a:avLst/>
+          </a:prstGeom>
+        </p:spPr>
+        <p:style>
+          <a:lnRef idx="2">
+            <a:schemeClr val="accent6">
+              <a:shade val="50000"/>
+            </a:schemeClr>
+          </a:lnRef>
+          <a:fillRef idx="1">
+            <a:schemeClr val="accent6"/>
+          </a:fillRef>
+          <a:effectRef idx="0">
+            <a:schemeClr val="accent6"/>
+          </a:effectRef>
+          <a:fontRef idx="minor">
+            <a:schemeClr val="lt1"/>
+          </a:fontRef>
+        </p:style>
+        <p:txBody>
+          <a:bodyPr rtlCol="0" anchor="ctr"/>
+          <a:lstStyle/>
+          <a:p>
+            <a:pPr algn="ctr"/>
+            <a:r>
+              <a:rPr lang="en-GB" sz="800" dirty="0"/>
+              <a:t>Once &amp; Done</a:t>
+            </a:r>
+            <a:endParaRPr lang="nl-NL" sz="800" dirty="0"/>
+          </a:p>
+        </p:txBody>
+      </p:sp>
+      <p:sp>
+        <p:nvSpPr>
+          <p:cNvPr id="19" name="Rechthoek 18">
+            <a:extLst>
+              <a:ext uri="{FF2B5EF4-FFF2-40B4-BE49-F238E27FC236}">
+                <a16:creationId xmlns:a16="http://schemas.microsoft.com/office/drawing/2014/main" id="{83B11F0C-13C2-F45E-0806-97569050BA6D}"/>
+              </a:ext>
+            </a:extLst>
+          </p:cNvPr>
+          <p:cNvSpPr/>
+          <p:nvPr/>
+        </p:nvSpPr>
+        <p:spPr>
+          <a:xfrm>
+            <a:off x="5712803" y="1650608"/>
+            <a:ext cx="773722" cy="389353"/>
+          </a:xfrm>
+          <a:prstGeom prst="rect">
+            <a:avLst/>
+          </a:prstGeom>
+        </p:spPr>
+        <p:style>
+          <a:lnRef idx="2">
+            <a:schemeClr val="accent6">
+              <a:shade val="50000"/>
+            </a:schemeClr>
+          </a:lnRef>
+          <a:fillRef idx="1">
+            <a:schemeClr val="accent6"/>
+          </a:fillRef>
+          <a:effectRef idx="0">
+            <a:schemeClr val="accent6"/>
+          </a:effectRef>
+          <a:fontRef idx="minor">
+            <a:schemeClr val="lt1"/>
+          </a:fontRef>
+        </p:style>
+        <p:txBody>
+          <a:bodyPr rtlCol="0" anchor="ctr"/>
+          <a:lstStyle/>
+          <a:p>
+            <a:pPr algn="ctr"/>
+            <a:r>
+              <a:rPr lang="en-GB" sz="800" dirty="0"/>
+              <a:t>Ongoing evolution</a:t>
+            </a:r>
+            <a:endParaRPr lang="nl-NL" sz="800" dirty="0"/>
+          </a:p>
+        </p:txBody>
+      </p:sp>
+      <p:sp>
+        <p:nvSpPr>
+          <p:cNvPr id="20" name="Rechthoek 19">
+            <a:extLst>
+              <a:ext uri="{FF2B5EF4-FFF2-40B4-BE49-F238E27FC236}">
+                <a16:creationId xmlns:a16="http://schemas.microsoft.com/office/drawing/2014/main" id="{E57846A7-1296-1CC5-98D0-0E37FC4242DF}"/>
+              </a:ext>
+            </a:extLst>
+          </p:cNvPr>
+          <p:cNvSpPr/>
+          <p:nvPr/>
+        </p:nvSpPr>
+        <p:spPr>
+          <a:xfrm>
+            <a:off x="4821848" y="2117626"/>
+            <a:ext cx="773722" cy="389353"/>
+          </a:xfrm>
+          <a:prstGeom prst="rect">
+            <a:avLst/>
+          </a:prstGeom>
+        </p:spPr>
+        <p:style>
+          <a:lnRef idx="2">
+            <a:schemeClr val="accent6">
+              <a:shade val="50000"/>
+            </a:schemeClr>
+          </a:lnRef>
+          <a:fillRef idx="1">
+            <a:schemeClr val="accent6"/>
+          </a:fillRef>
+          <a:effectRef idx="0">
+            <a:schemeClr val="accent6"/>
+          </a:effectRef>
+          <a:fontRef idx="minor">
+            <a:schemeClr val="lt1"/>
+          </a:fontRef>
+        </p:style>
+        <p:txBody>
+          <a:bodyPr rtlCol="0" anchor="ctr"/>
+          <a:lstStyle/>
+          <a:p>
+            <a:pPr algn="ctr"/>
+            <a:r>
+              <a:rPr lang="en-GB" sz="800" dirty="0"/>
+              <a:t>A plan broken down into smaller pieces</a:t>
+            </a:r>
+          </a:p>
+        </p:txBody>
+      </p:sp>
+      <p:sp>
+        <p:nvSpPr>
+          <p:cNvPr id="21" name="Rechthoek 20">
+            <a:extLst>
+              <a:ext uri="{FF2B5EF4-FFF2-40B4-BE49-F238E27FC236}">
+                <a16:creationId xmlns:a16="http://schemas.microsoft.com/office/drawing/2014/main" id="{2900AE6D-C855-19AD-8F2E-F6426F36D329}"/>
+              </a:ext>
+            </a:extLst>
+          </p:cNvPr>
+          <p:cNvSpPr/>
+          <p:nvPr/>
+        </p:nvSpPr>
+        <p:spPr>
+          <a:xfrm>
+            <a:off x="5712803" y="2117626"/>
+            <a:ext cx="773722" cy="389353"/>
+          </a:xfrm>
+          <a:prstGeom prst="rect">
+            <a:avLst/>
+          </a:prstGeom>
+        </p:spPr>
+        <p:style>
+          <a:lnRef idx="2">
+            <a:schemeClr val="accent6">
+              <a:shade val="50000"/>
+            </a:schemeClr>
+          </a:lnRef>
+          <a:fillRef idx="1">
+            <a:schemeClr val="accent6"/>
+          </a:fillRef>
+          <a:effectRef idx="0">
+            <a:schemeClr val="accent6"/>
+          </a:effectRef>
+          <a:fontRef idx="minor">
+            <a:schemeClr val="lt1"/>
+          </a:fontRef>
+        </p:style>
+        <p:txBody>
+          <a:bodyPr rtlCol="0" anchor="ctr"/>
+          <a:lstStyle/>
+          <a:p>
+            <a:pPr algn="ctr"/>
+            <a:r>
+              <a:rPr lang="en-GB" sz="800" dirty="0"/>
+              <a:t>Achieving incremental goals</a:t>
+            </a:r>
+          </a:p>
+        </p:txBody>
+      </p:sp>
+      <p:sp>
+        <p:nvSpPr>
+          <p:cNvPr id="22" name="Rechthoek 21">
+            <a:extLst>
+              <a:ext uri="{FF2B5EF4-FFF2-40B4-BE49-F238E27FC236}">
+                <a16:creationId xmlns:a16="http://schemas.microsoft.com/office/drawing/2014/main" id="{C4119797-7CEF-25F9-3993-1061927000A5}"/>
+              </a:ext>
+            </a:extLst>
+          </p:cNvPr>
+          <p:cNvSpPr/>
+          <p:nvPr/>
+        </p:nvSpPr>
+        <p:spPr>
+          <a:xfrm>
+            <a:off x="4821848" y="2584644"/>
+            <a:ext cx="773722" cy="389353"/>
+          </a:xfrm>
+          <a:prstGeom prst="rect">
+            <a:avLst/>
+          </a:prstGeom>
+        </p:spPr>
+        <p:style>
+          <a:lnRef idx="2">
+            <a:schemeClr val="accent6">
+              <a:shade val="50000"/>
+            </a:schemeClr>
+          </a:lnRef>
+          <a:fillRef idx="1">
+            <a:schemeClr val="accent6"/>
+          </a:fillRef>
+          <a:effectRef idx="0">
+            <a:schemeClr val="accent6"/>
+          </a:effectRef>
+          <a:fontRef idx="minor">
+            <a:schemeClr val="lt1"/>
+          </a:fontRef>
+        </p:style>
+        <p:txBody>
+          <a:bodyPr rtlCol="0" anchor="ctr"/>
+          <a:lstStyle/>
+          <a:p>
+            <a:pPr algn="ctr"/>
+            <a:r>
+              <a:rPr lang="en-GB" sz="800" dirty="0"/>
+              <a:t>Upfront Analysis</a:t>
+            </a:r>
+            <a:endParaRPr lang="nl-NL" sz="800" dirty="0"/>
+          </a:p>
+        </p:txBody>
+      </p:sp>
+      <p:sp>
+        <p:nvSpPr>
+          <p:cNvPr id="23" name="Rechthoek 22">
+            <a:extLst>
+              <a:ext uri="{FF2B5EF4-FFF2-40B4-BE49-F238E27FC236}">
+                <a16:creationId xmlns:a16="http://schemas.microsoft.com/office/drawing/2014/main" id="{AFC77E1A-4436-8AC8-CB61-9E2BAB7A8A81}"/>
+              </a:ext>
+            </a:extLst>
+          </p:cNvPr>
+          <p:cNvSpPr/>
+          <p:nvPr/>
+        </p:nvSpPr>
+        <p:spPr>
+          <a:xfrm>
+            <a:off x="5712803" y="2584644"/>
+            <a:ext cx="773722" cy="389353"/>
+          </a:xfrm>
+          <a:prstGeom prst="rect">
+            <a:avLst/>
+          </a:prstGeom>
+        </p:spPr>
+        <p:style>
+          <a:lnRef idx="2">
+            <a:schemeClr val="accent6">
+              <a:shade val="50000"/>
+            </a:schemeClr>
+          </a:lnRef>
+          <a:fillRef idx="1">
+            <a:schemeClr val="accent6"/>
+          </a:fillRef>
+          <a:effectRef idx="0">
+            <a:schemeClr val="accent6"/>
+          </a:effectRef>
+          <a:fontRef idx="minor">
+            <a:schemeClr val="lt1"/>
+          </a:fontRef>
+        </p:style>
+        <p:txBody>
+          <a:bodyPr rtlCol="0" anchor="ctr"/>
+          <a:lstStyle/>
+          <a:p>
+            <a:pPr algn="ctr"/>
+            <a:r>
+              <a:rPr lang="en-GB" sz="800" dirty="0"/>
+              <a:t>Just-in-time resolution</a:t>
+            </a:r>
+            <a:endParaRPr lang="nl-NL" sz="800" dirty="0"/>
+          </a:p>
+        </p:txBody>
+      </p:sp>
+      <p:sp>
+        <p:nvSpPr>
+          <p:cNvPr id="24" name="Rechthoek 23">
+            <a:extLst>
+              <a:ext uri="{FF2B5EF4-FFF2-40B4-BE49-F238E27FC236}">
+                <a16:creationId xmlns:a16="http://schemas.microsoft.com/office/drawing/2014/main" id="{731C8DDD-2492-2828-DFC8-F107B21F9D5C}"/>
+              </a:ext>
+            </a:extLst>
+          </p:cNvPr>
+          <p:cNvSpPr/>
+          <p:nvPr/>
+        </p:nvSpPr>
+        <p:spPr>
+          <a:xfrm>
+            <a:off x="4821848" y="3051662"/>
+            <a:ext cx="773722" cy="389353"/>
+          </a:xfrm>
+          <a:prstGeom prst="rect">
+            <a:avLst/>
+          </a:prstGeom>
+        </p:spPr>
+        <p:style>
+          <a:lnRef idx="2">
+            <a:schemeClr val="accent6">
+              <a:shade val="50000"/>
+            </a:schemeClr>
+          </a:lnRef>
+          <a:fillRef idx="1">
+            <a:schemeClr val="accent6"/>
+          </a:fillRef>
+          <a:effectRef idx="0">
+            <a:schemeClr val="accent6"/>
+          </a:effectRef>
+          <a:fontRef idx="minor">
+            <a:schemeClr val="lt1"/>
+          </a:fontRef>
+        </p:style>
+        <p:txBody>
+          <a:bodyPr rtlCol="0" anchor="ctr"/>
+          <a:lstStyle/>
+          <a:p>
+            <a:pPr algn="ctr"/>
+            <a:r>
+              <a:rPr lang="en-GB" sz="800" dirty="0"/>
+              <a:t>Scope, time &amp; budget</a:t>
+            </a:r>
+          </a:p>
+        </p:txBody>
+      </p:sp>
+      <p:sp>
+        <p:nvSpPr>
+          <p:cNvPr id="25" name="Rechthoek 24">
+            <a:extLst>
+              <a:ext uri="{FF2B5EF4-FFF2-40B4-BE49-F238E27FC236}">
+                <a16:creationId xmlns:a16="http://schemas.microsoft.com/office/drawing/2014/main" id="{CC31B58D-8DB9-E80E-15A9-47AA854BAE17}"/>
+              </a:ext>
+            </a:extLst>
+          </p:cNvPr>
+          <p:cNvSpPr/>
+          <p:nvPr/>
+        </p:nvSpPr>
+        <p:spPr>
+          <a:xfrm>
+            <a:off x="5712803" y="3051662"/>
+            <a:ext cx="773722" cy="389353"/>
+          </a:xfrm>
+          <a:prstGeom prst="rect">
+            <a:avLst/>
+          </a:prstGeom>
+        </p:spPr>
+        <p:style>
+          <a:lnRef idx="2">
+            <a:schemeClr val="accent6">
+              <a:shade val="50000"/>
+            </a:schemeClr>
+          </a:lnRef>
+          <a:fillRef idx="1">
+            <a:schemeClr val="accent6"/>
+          </a:fillRef>
+          <a:effectRef idx="0">
+            <a:schemeClr val="accent6"/>
+          </a:effectRef>
+          <a:fontRef idx="minor">
+            <a:schemeClr val="lt1"/>
+          </a:fontRef>
+        </p:style>
+        <p:txBody>
+          <a:bodyPr rtlCol="0" anchor="ctr"/>
+          <a:lstStyle/>
+          <a:p>
+            <a:pPr algn="ctr"/>
+            <a:r>
+              <a:rPr lang="en-GB" sz="800" dirty="0"/>
+              <a:t>Customer focus</a:t>
+            </a:r>
+            <a:endParaRPr lang="nl-NL" sz="800" dirty="0"/>
+          </a:p>
+        </p:txBody>
+      </p:sp>
+      <p:sp>
+        <p:nvSpPr>
+          <p:cNvPr id="26" name="Rechthoek 25">
+            <a:extLst>
+              <a:ext uri="{FF2B5EF4-FFF2-40B4-BE49-F238E27FC236}">
+                <a16:creationId xmlns:a16="http://schemas.microsoft.com/office/drawing/2014/main" id="{84C90981-2FCA-4783-A017-9D6D602F838B}"/>
+              </a:ext>
+            </a:extLst>
+          </p:cNvPr>
+          <p:cNvSpPr/>
+          <p:nvPr/>
+        </p:nvSpPr>
+        <p:spPr>
+          <a:xfrm>
+            <a:off x="4821848" y="3518680"/>
+            <a:ext cx="773722" cy="389353"/>
+          </a:xfrm>
+          <a:prstGeom prst="rect">
+            <a:avLst/>
+          </a:prstGeom>
+        </p:spPr>
+        <p:style>
+          <a:lnRef idx="2">
+            <a:schemeClr val="accent6">
+              <a:shade val="50000"/>
+            </a:schemeClr>
+          </a:lnRef>
+          <a:fillRef idx="1">
+            <a:schemeClr val="accent6"/>
+          </a:fillRef>
+          <a:effectRef idx="0">
+            <a:schemeClr val="accent6"/>
+          </a:effectRef>
+          <a:fontRef idx="minor">
+            <a:schemeClr val="lt1"/>
+          </a:fontRef>
+        </p:style>
+        <p:txBody>
+          <a:bodyPr rtlCol="0" anchor="ctr"/>
+          <a:lstStyle/>
+          <a:p>
+            <a:pPr algn="ctr"/>
+            <a:r>
+              <a:rPr lang="en-GB" sz="800" dirty="0"/>
+              <a:t>Follow the plan</a:t>
+            </a:r>
+            <a:endParaRPr lang="nl-NL" sz="800" dirty="0"/>
+          </a:p>
+        </p:txBody>
+      </p:sp>
+      <p:sp>
+        <p:nvSpPr>
+          <p:cNvPr id="27" name="Rechthoek 26">
+            <a:extLst>
+              <a:ext uri="{FF2B5EF4-FFF2-40B4-BE49-F238E27FC236}">
+                <a16:creationId xmlns:a16="http://schemas.microsoft.com/office/drawing/2014/main" id="{9AFA2DB4-25CD-3B33-9DD9-F0E30D0A8BE8}"/>
+              </a:ext>
+            </a:extLst>
+          </p:cNvPr>
+          <p:cNvSpPr/>
+          <p:nvPr/>
+        </p:nvSpPr>
+        <p:spPr>
+          <a:xfrm>
+            <a:off x="5712803" y="3518680"/>
+            <a:ext cx="773722" cy="389353"/>
+          </a:xfrm>
+          <a:prstGeom prst="rect">
+            <a:avLst/>
+          </a:prstGeom>
+        </p:spPr>
+        <p:style>
+          <a:lnRef idx="2">
+            <a:schemeClr val="accent6">
+              <a:shade val="50000"/>
+            </a:schemeClr>
+          </a:lnRef>
+          <a:fillRef idx="1">
+            <a:schemeClr val="accent6"/>
+          </a:fillRef>
+          <a:effectRef idx="0">
+            <a:schemeClr val="accent6"/>
+          </a:effectRef>
+          <a:fontRef idx="minor">
+            <a:schemeClr val="lt1"/>
+          </a:fontRef>
+        </p:style>
+        <p:txBody>
+          <a:bodyPr rtlCol="0" anchor="ctr"/>
+          <a:lstStyle/>
+          <a:p>
+            <a:pPr algn="ctr"/>
+            <a:r>
+              <a:rPr lang="en-GB" sz="800" dirty="0"/>
+              <a:t>Inspect &amp; Adapt</a:t>
+            </a:r>
+            <a:endParaRPr lang="nl-NL" sz="800" dirty="0"/>
+          </a:p>
+        </p:txBody>
+      </p:sp>
+      <p:sp>
+        <p:nvSpPr>
+          <p:cNvPr id="28" name="Rechthoek 27">
+            <a:extLst>
+              <a:ext uri="{FF2B5EF4-FFF2-40B4-BE49-F238E27FC236}">
+                <a16:creationId xmlns:a16="http://schemas.microsoft.com/office/drawing/2014/main" id="{9F11DC23-B023-D693-5763-8BC181902AF9}"/>
+              </a:ext>
+            </a:extLst>
+          </p:cNvPr>
+          <p:cNvSpPr/>
+          <p:nvPr/>
+        </p:nvSpPr>
+        <p:spPr>
+          <a:xfrm>
+            <a:off x="4821848" y="3985698"/>
+            <a:ext cx="773722" cy="389353"/>
+          </a:xfrm>
+          <a:prstGeom prst="rect">
+            <a:avLst/>
+          </a:prstGeom>
+        </p:spPr>
+        <p:style>
+          <a:lnRef idx="2">
+            <a:schemeClr val="accent6">
+              <a:shade val="50000"/>
+            </a:schemeClr>
+          </a:lnRef>
+          <a:fillRef idx="1">
+            <a:schemeClr val="accent6"/>
+          </a:fillRef>
+          <a:effectRef idx="0">
+            <a:schemeClr val="accent6"/>
+          </a:effectRef>
+          <a:fontRef idx="minor">
+            <a:schemeClr val="lt1"/>
+          </a:fontRef>
+        </p:style>
+        <p:txBody>
+          <a:bodyPr rtlCol="0" anchor="ctr"/>
+          <a:lstStyle/>
+          <a:p>
+            <a:pPr algn="ctr"/>
+            <a:r>
+              <a:rPr lang="en-GB" sz="800" dirty="0"/>
+              <a:t>Output driven</a:t>
+            </a:r>
+            <a:endParaRPr lang="nl-NL" sz="800" dirty="0"/>
+          </a:p>
+        </p:txBody>
+      </p:sp>
+      <p:sp>
+        <p:nvSpPr>
+          <p:cNvPr id="29" name="Rechthoek 28">
+            <a:extLst>
+              <a:ext uri="{FF2B5EF4-FFF2-40B4-BE49-F238E27FC236}">
+                <a16:creationId xmlns:a16="http://schemas.microsoft.com/office/drawing/2014/main" id="{26918194-BE28-3B15-7175-875563A85D10}"/>
+              </a:ext>
+            </a:extLst>
+          </p:cNvPr>
+          <p:cNvSpPr/>
+          <p:nvPr/>
+        </p:nvSpPr>
+        <p:spPr>
+          <a:xfrm>
+            <a:off x="5712803" y="3985698"/>
+            <a:ext cx="773722" cy="389353"/>
+          </a:xfrm>
+          <a:prstGeom prst="rect">
+            <a:avLst/>
+          </a:prstGeom>
+        </p:spPr>
+        <p:style>
+          <a:lnRef idx="2">
+            <a:schemeClr val="accent6">
+              <a:shade val="50000"/>
+            </a:schemeClr>
+          </a:lnRef>
+          <a:fillRef idx="1">
+            <a:schemeClr val="accent6"/>
+          </a:fillRef>
+          <a:effectRef idx="0">
+            <a:schemeClr val="accent6"/>
+          </a:effectRef>
+          <a:fontRef idx="minor">
+            <a:schemeClr val="lt1"/>
+          </a:fontRef>
+        </p:style>
+        <p:txBody>
+          <a:bodyPr rtlCol="0" anchor="ctr"/>
+          <a:lstStyle/>
+          <a:p>
+            <a:pPr algn="ctr"/>
+            <a:r>
+              <a:rPr lang="en-GB" sz="800" dirty="0"/>
+              <a:t>Outcome driven</a:t>
+            </a:r>
+            <a:endParaRPr lang="nl-NL" sz="800" dirty="0"/>
+          </a:p>
+        </p:txBody>
+      </p:sp>
+    </p:spTree>
+    <p:extLst>
+      <p:ext uri="{BB962C8B-B14F-4D97-AF65-F5344CB8AC3E}">
+        <p14:creationId xmlns:p14="http://schemas.microsoft.com/office/powerpoint/2010/main" val="3017568295"/>
+      </p:ext>
+    </p:extLst>
+  </p:cSld>
+  <p:clrMapOvr>
+    <a:masterClrMapping/>
+  </p:clrMapOvr>
+</p:sld>
+</file>
+
+<file path=ppt/slides/slide6.xml><?xml version="1.0" encoding="utf-8"?>
+<p:sld xmlns:a="http://schemas.openxmlformats.org/drawingml/2006/main" xmlns:r="http://schemas.openxmlformats.org/officeDocument/2006/relationships" xmlns:p="http://schemas.openxmlformats.org/presentationml/2006/main">
+  <p:cSld>
+    <p:spTree>
+      <p:nvGrpSpPr>
+        <p:cNvPr id="1" name=""/>
+        <p:cNvGrpSpPr/>
+        <p:nvPr/>
+      </p:nvGrpSpPr>
+      <p:grpSpPr>
+        <a:xfrm>
+          <a:off x="0" y="0"/>
+          <a:ext cx="0" cy="0"/>
+          <a:chOff x="0" y="0"/>
+          <a:chExt cx="0" cy="0"/>
+        </a:xfrm>
+      </p:grpSpPr>
+      <p:sp>
+        <p:nvSpPr>
+          <p:cNvPr id="2" name="Tijdelijke aanduiding voor voettekst 1">
+            <a:extLst>
+              <a:ext uri="{FF2B5EF4-FFF2-40B4-BE49-F238E27FC236}">
+                <a16:creationId xmlns:a16="http://schemas.microsoft.com/office/drawing/2014/main" id="{03ACDC0D-A143-7EDC-7637-F1E87227B39C}"/>
+              </a:ext>
+            </a:extLst>
+          </p:cNvPr>
+          <p:cNvSpPr>
+            <a:spLocks noGrp="1"/>
+          </p:cNvSpPr>
+          <p:nvPr>
+            <p:ph type="ftr" sz="quarter" idx="11"/>
+          </p:nvPr>
+        </p:nvSpPr>
+        <p:spPr/>
+        <p:txBody>
+          <a:bodyPr/>
+          <a:lstStyle/>
+          <a:p>
+            <a:r>
+              <a:rPr lang="en-GB"/>
+              <a:t>1.1</a:t>
+            </a:r>
+            <a:endParaRPr lang="en-NL"/>
+          </a:p>
+        </p:txBody>
+      </p:sp>
+    </p:spTree>
+    <p:extLst>
+      <p:ext uri="{BB962C8B-B14F-4D97-AF65-F5344CB8AC3E}">
+        <p14:creationId xmlns:p14="http://schemas.microsoft.com/office/powerpoint/2010/main" val="404066388"/>
+      </p:ext>
+    </p:extLst>
+  </p:cSld>
+  <p:clrMapOvr>
+    <a:masterClrMapping/>
+  </p:clrMapOvr>
+</p:sld>
+</file>
+
+<file path=ppt/slides/slide7.xml><?xml version="1.0" encoding="utf-8"?>
 <p:sld xmlns:a="http://schemas.openxmlformats.org/drawingml/2006/main" xmlns:r="http://schemas.openxmlformats.org/officeDocument/2006/relationships" xmlns:p="http://schemas.openxmlformats.org/presentationml/2006/main">
   <p:cSld>
     <p:spTree>
@@ -16746,546 +19009,7 @@
 </p:sld>
 </file>
 
-<file path=ppt/slides/slide30.xml><?xml version="1.0" encoding="utf-8"?>
-<p:sld xmlns:a="http://schemas.openxmlformats.org/drawingml/2006/main" xmlns:r="http://schemas.openxmlformats.org/officeDocument/2006/relationships" xmlns:p="http://schemas.openxmlformats.org/presentationml/2006/main">
-  <p:cSld>
-    <p:spTree>
-      <p:nvGrpSpPr>
-        <p:cNvPr id="1" name=""/>
-        <p:cNvGrpSpPr/>
-        <p:nvPr/>
-      </p:nvGrpSpPr>
-      <p:grpSpPr>
-        <a:xfrm>
-          <a:off x="0" y="0"/>
-          <a:ext cx="0" cy="0"/>
-          <a:chOff x="0" y="0"/>
-          <a:chExt cx="0" cy="0"/>
-        </a:xfrm>
-      </p:grpSpPr>
-      <p:sp>
-        <p:nvSpPr>
-          <p:cNvPr id="2" name="Tijdelijke aanduiding voor voettekst 1">
-            <a:extLst>
-              <a:ext uri="{FF2B5EF4-FFF2-40B4-BE49-F238E27FC236}">
-                <a16:creationId xmlns:a16="http://schemas.microsoft.com/office/drawing/2014/main" id="{E1B86FFD-6927-8AA9-41F7-0AA541198A36}"/>
-              </a:ext>
-            </a:extLst>
-          </p:cNvPr>
-          <p:cNvSpPr>
-            <a:spLocks noGrp="1"/>
-          </p:cNvSpPr>
-          <p:nvPr>
-            <p:ph type="ftr" sz="quarter" idx="11"/>
-          </p:nvPr>
-        </p:nvSpPr>
-        <p:spPr/>
-        <p:txBody>
-          <a:bodyPr/>
-          <a:lstStyle/>
-          <a:p>
-            <a:r>
-              <a:rPr lang="en-GB"/>
-              <a:t>V 1.0</a:t>
-            </a:r>
-            <a:endParaRPr lang="en-NL"/>
-          </a:p>
-        </p:txBody>
-      </p:sp>
-    </p:spTree>
-    <p:extLst>
-      <p:ext uri="{BB962C8B-B14F-4D97-AF65-F5344CB8AC3E}">
-        <p14:creationId xmlns:p14="http://schemas.microsoft.com/office/powerpoint/2010/main" val="3961148122"/>
-      </p:ext>
-    </p:extLst>
-  </p:cSld>
-  <p:clrMapOvr>
-    <a:masterClrMapping/>
-  </p:clrMapOvr>
-</p:sld>
-</file>
-
-<file path=ppt/slides/slide31.xml><?xml version="1.0" encoding="utf-8"?>
-<p:sld xmlns:a="http://schemas.openxmlformats.org/drawingml/2006/main" xmlns:r="http://schemas.openxmlformats.org/officeDocument/2006/relationships" xmlns:p="http://schemas.openxmlformats.org/presentationml/2006/main">
-  <p:cSld>
-    <p:spTree>
-      <p:nvGrpSpPr>
-        <p:cNvPr id="1" name=""/>
-        <p:cNvGrpSpPr/>
-        <p:nvPr/>
-      </p:nvGrpSpPr>
-      <p:grpSpPr>
-        <a:xfrm>
-          <a:off x="0" y="0"/>
-          <a:ext cx="0" cy="0"/>
-          <a:chOff x="0" y="0"/>
-          <a:chExt cx="0" cy="0"/>
-        </a:xfrm>
-      </p:grpSpPr>
-      <p:sp>
-        <p:nvSpPr>
-          <p:cNvPr id="3" name="Tijdelijke aanduiding voor tekst 2">
-            <a:extLst>
-              <a:ext uri="{FF2B5EF4-FFF2-40B4-BE49-F238E27FC236}">
-                <a16:creationId xmlns:a16="http://schemas.microsoft.com/office/drawing/2014/main" id="{020FEFFD-AC21-5E43-DC49-B20749D41846}"/>
-              </a:ext>
-            </a:extLst>
-          </p:cNvPr>
-          <p:cNvSpPr>
-            <a:spLocks noGrp="1"/>
-          </p:cNvSpPr>
-          <p:nvPr>
-            <p:ph type="body" sz="quarter" idx="12"/>
-          </p:nvPr>
-        </p:nvSpPr>
-        <p:spPr/>
-        <p:txBody>
-          <a:bodyPr/>
-          <a:lstStyle/>
-          <a:p>
-            <a:r>
-              <a:rPr lang="en-NL" sz="6000">
-                <a:latin typeface="American Captain" pitchFamily="2" charset="77"/>
-              </a:rPr>
-              <a:t>Output driven</a:t>
-            </a:r>
-            <a:endParaRPr lang="nl-NL" dirty="0"/>
-          </a:p>
-        </p:txBody>
-      </p:sp>
-    </p:spTree>
-    <p:extLst>
-      <p:ext uri="{BB962C8B-B14F-4D97-AF65-F5344CB8AC3E}">
-        <p14:creationId xmlns:p14="http://schemas.microsoft.com/office/powerpoint/2010/main" val="443291172"/>
-      </p:ext>
-    </p:extLst>
-  </p:cSld>
-  <p:clrMapOvr>
-    <a:masterClrMapping/>
-  </p:clrMapOvr>
-</p:sld>
-</file>
-
-<file path=ppt/slides/slide32.xml><?xml version="1.0" encoding="utf-8"?>
-<p:sld xmlns:a="http://schemas.openxmlformats.org/drawingml/2006/main" xmlns:r="http://schemas.openxmlformats.org/officeDocument/2006/relationships" xmlns:p="http://schemas.openxmlformats.org/presentationml/2006/main">
-  <p:cSld>
-    <p:spTree>
-      <p:nvGrpSpPr>
-        <p:cNvPr id="1" name=""/>
-        <p:cNvGrpSpPr/>
-        <p:nvPr/>
-      </p:nvGrpSpPr>
-      <p:grpSpPr>
-        <a:xfrm>
-          <a:off x="0" y="0"/>
-          <a:ext cx="0" cy="0"/>
-          <a:chOff x="0" y="0"/>
-          <a:chExt cx="0" cy="0"/>
-        </a:xfrm>
-      </p:grpSpPr>
-      <p:sp>
-        <p:nvSpPr>
-          <p:cNvPr id="2" name="Tijdelijke aanduiding voor voettekst 1">
-            <a:extLst>
-              <a:ext uri="{FF2B5EF4-FFF2-40B4-BE49-F238E27FC236}">
-                <a16:creationId xmlns:a16="http://schemas.microsoft.com/office/drawing/2014/main" id="{E1B86FFD-6927-8AA9-41F7-0AA541198A36}"/>
-              </a:ext>
-            </a:extLst>
-          </p:cNvPr>
-          <p:cNvSpPr>
-            <a:spLocks noGrp="1"/>
-          </p:cNvSpPr>
-          <p:nvPr>
-            <p:ph type="ftr" sz="quarter" idx="11"/>
-          </p:nvPr>
-        </p:nvSpPr>
-        <p:spPr/>
-        <p:txBody>
-          <a:bodyPr/>
-          <a:lstStyle/>
-          <a:p>
-            <a:r>
-              <a:rPr lang="en-GB"/>
-              <a:t>V 1.0</a:t>
-            </a:r>
-            <a:endParaRPr lang="en-NL"/>
-          </a:p>
-        </p:txBody>
-      </p:sp>
-    </p:spTree>
-    <p:extLst>
-      <p:ext uri="{BB962C8B-B14F-4D97-AF65-F5344CB8AC3E}">
-        <p14:creationId xmlns:p14="http://schemas.microsoft.com/office/powerpoint/2010/main" val="485861662"/>
-      </p:ext>
-    </p:extLst>
-  </p:cSld>
-  <p:clrMapOvr>
-    <a:masterClrMapping/>
-  </p:clrMapOvr>
-</p:sld>
-</file>
-
-<file path=ppt/slides/slide33.xml><?xml version="1.0" encoding="utf-8"?>
-<p:sld xmlns:a="http://schemas.openxmlformats.org/drawingml/2006/main" xmlns:r="http://schemas.openxmlformats.org/officeDocument/2006/relationships" xmlns:p="http://schemas.openxmlformats.org/presentationml/2006/main">
-  <p:cSld>
-    <p:spTree>
-      <p:nvGrpSpPr>
-        <p:cNvPr id="1" name=""/>
-        <p:cNvGrpSpPr/>
-        <p:nvPr/>
-      </p:nvGrpSpPr>
-      <p:grpSpPr>
-        <a:xfrm>
-          <a:off x="0" y="0"/>
-          <a:ext cx="0" cy="0"/>
-          <a:chOff x="0" y="0"/>
-          <a:chExt cx="0" cy="0"/>
-        </a:xfrm>
-      </p:grpSpPr>
-      <p:sp>
-        <p:nvSpPr>
-          <p:cNvPr id="3" name="Tijdelijke aanduiding voor tekst 2">
-            <a:extLst>
-              <a:ext uri="{FF2B5EF4-FFF2-40B4-BE49-F238E27FC236}">
-                <a16:creationId xmlns:a16="http://schemas.microsoft.com/office/drawing/2014/main" id="{894A383D-31A2-EBA8-D4E5-C96B0AF092A5}"/>
-              </a:ext>
-            </a:extLst>
-          </p:cNvPr>
-          <p:cNvSpPr>
-            <a:spLocks noGrp="1"/>
-          </p:cNvSpPr>
-          <p:nvPr>
-            <p:ph type="body" sz="quarter" idx="12"/>
-          </p:nvPr>
-        </p:nvSpPr>
-        <p:spPr/>
-        <p:txBody>
-          <a:bodyPr/>
-          <a:lstStyle/>
-          <a:p>
-            <a:r>
-              <a:rPr lang="en-NL" sz="6000">
-                <a:latin typeface="American Captain" pitchFamily="2" charset="77"/>
-              </a:rPr>
-              <a:t>Outcome driven</a:t>
-            </a:r>
-            <a:endParaRPr lang="nl-NL" dirty="0"/>
-          </a:p>
-        </p:txBody>
-      </p:sp>
-    </p:spTree>
-    <p:extLst>
-      <p:ext uri="{BB962C8B-B14F-4D97-AF65-F5344CB8AC3E}">
-        <p14:creationId xmlns:p14="http://schemas.microsoft.com/office/powerpoint/2010/main" val="100569236"/>
-      </p:ext>
-    </p:extLst>
-  </p:cSld>
-  <p:clrMapOvr>
-    <a:masterClrMapping/>
-  </p:clrMapOvr>
-</p:sld>
-</file>
-
-<file path=ppt/slides/slide34.xml><?xml version="1.0" encoding="utf-8"?>
-<p:sld xmlns:a="http://schemas.openxmlformats.org/drawingml/2006/main" xmlns:r="http://schemas.openxmlformats.org/officeDocument/2006/relationships" xmlns:p="http://schemas.openxmlformats.org/presentationml/2006/main">
-  <p:cSld>
-    <p:spTree>
-      <p:nvGrpSpPr>
-        <p:cNvPr id="1" name=""/>
-        <p:cNvGrpSpPr/>
-        <p:nvPr/>
-      </p:nvGrpSpPr>
-      <p:grpSpPr>
-        <a:xfrm>
-          <a:off x="0" y="0"/>
-          <a:ext cx="0" cy="0"/>
-          <a:chOff x="0" y="0"/>
-          <a:chExt cx="0" cy="0"/>
-        </a:xfrm>
-      </p:grpSpPr>
-      <p:sp>
-        <p:nvSpPr>
-          <p:cNvPr id="2" name="Tijdelijke aanduiding voor voettekst 1">
-            <a:extLst>
-              <a:ext uri="{FF2B5EF4-FFF2-40B4-BE49-F238E27FC236}">
-                <a16:creationId xmlns:a16="http://schemas.microsoft.com/office/drawing/2014/main" id="{E1B86FFD-6927-8AA9-41F7-0AA541198A36}"/>
-              </a:ext>
-            </a:extLst>
-          </p:cNvPr>
-          <p:cNvSpPr>
-            <a:spLocks noGrp="1"/>
-          </p:cNvSpPr>
-          <p:nvPr>
-            <p:ph type="ftr" sz="quarter" idx="11"/>
-          </p:nvPr>
-        </p:nvSpPr>
-        <p:spPr/>
-        <p:txBody>
-          <a:bodyPr/>
-          <a:lstStyle/>
-          <a:p>
-            <a:r>
-              <a:rPr lang="en-GB"/>
-              <a:t>V 1.0</a:t>
-            </a:r>
-            <a:endParaRPr lang="en-NL"/>
-          </a:p>
-        </p:txBody>
-      </p:sp>
-    </p:spTree>
-    <p:extLst>
-      <p:ext uri="{BB962C8B-B14F-4D97-AF65-F5344CB8AC3E}">
-        <p14:creationId xmlns:p14="http://schemas.microsoft.com/office/powerpoint/2010/main" val="3785264099"/>
-      </p:ext>
-    </p:extLst>
-  </p:cSld>
-  <p:clrMapOvr>
-    <a:masterClrMapping/>
-  </p:clrMapOvr>
-</p:sld>
-</file>
-
-<file path=ppt/slides/slide35.xml><?xml version="1.0" encoding="utf-8"?>
-<p:sld xmlns:a="http://schemas.openxmlformats.org/drawingml/2006/main" xmlns:r="http://schemas.openxmlformats.org/officeDocument/2006/relationships" xmlns:p="http://schemas.openxmlformats.org/presentationml/2006/main">
-  <p:cSld>
-    <p:spTree>
-      <p:nvGrpSpPr>
-        <p:cNvPr id="1" name=""/>
-        <p:cNvGrpSpPr/>
-        <p:nvPr/>
-      </p:nvGrpSpPr>
-      <p:grpSpPr>
-        <a:xfrm>
-          <a:off x="0" y="0"/>
-          <a:ext cx="0" cy="0"/>
-          <a:chOff x="0" y="0"/>
-          <a:chExt cx="0" cy="0"/>
-        </a:xfrm>
-      </p:grpSpPr>
-      <p:sp>
-        <p:nvSpPr>
-          <p:cNvPr id="3" name="Tijdelijke aanduiding voor tekst 2">
-            <a:extLst>
-              <a:ext uri="{FF2B5EF4-FFF2-40B4-BE49-F238E27FC236}">
-                <a16:creationId xmlns:a16="http://schemas.microsoft.com/office/drawing/2014/main" id="{7F0B2EC5-85B2-A2B6-2646-6DDCED3FB8DF}"/>
-              </a:ext>
-            </a:extLst>
-          </p:cNvPr>
-          <p:cNvSpPr>
-            <a:spLocks noGrp="1"/>
-          </p:cNvSpPr>
-          <p:nvPr>
-            <p:ph type="body" sz="quarter" idx="12"/>
-          </p:nvPr>
-        </p:nvSpPr>
-        <p:spPr/>
-        <p:txBody>
-          <a:bodyPr/>
-          <a:lstStyle/>
-          <a:p>
-            <a:r>
-              <a:rPr lang="en-NL" sz="6000">
-                <a:latin typeface="American Captain" pitchFamily="2" charset="77"/>
-              </a:rPr>
-              <a:t>Driven by a plan</a:t>
-            </a:r>
-            <a:endParaRPr lang="nl-NL" dirty="0"/>
-          </a:p>
-        </p:txBody>
-      </p:sp>
-    </p:spTree>
-    <p:extLst>
-      <p:ext uri="{BB962C8B-B14F-4D97-AF65-F5344CB8AC3E}">
-        <p14:creationId xmlns:p14="http://schemas.microsoft.com/office/powerpoint/2010/main" val="754634112"/>
-      </p:ext>
-    </p:extLst>
-  </p:cSld>
-  <p:clrMapOvr>
-    <a:masterClrMapping/>
-  </p:clrMapOvr>
-</p:sld>
-</file>
-
-<file path=ppt/slides/slide36.xml><?xml version="1.0" encoding="utf-8"?>
-<p:sld xmlns:a="http://schemas.openxmlformats.org/drawingml/2006/main" xmlns:r="http://schemas.openxmlformats.org/officeDocument/2006/relationships" xmlns:p="http://schemas.openxmlformats.org/presentationml/2006/main">
-  <p:cSld>
-    <p:spTree>
-      <p:nvGrpSpPr>
-        <p:cNvPr id="1" name=""/>
-        <p:cNvGrpSpPr/>
-        <p:nvPr/>
-      </p:nvGrpSpPr>
-      <p:grpSpPr>
-        <a:xfrm>
-          <a:off x="0" y="0"/>
-          <a:ext cx="0" cy="0"/>
-          <a:chOff x="0" y="0"/>
-          <a:chExt cx="0" cy="0"/>
-        </a:xfrm>
-      </p:grpSpPr>
-      <p:sp>
-        <p:nvSpPr>
-          <p:cNvPr id="2" name="Tijdelijke aanduiding voor voettekst 1">
-            <a:extLst>
-              <a:ext uri="{FF2B5EF4-FFF2-40B4-BE49-F238E27FC236}">
-                <a16:creationId xmlns:a16="http://schemas.microsoft.com/office/drawing/2014/main" id="{E1B86FFD-6927-8AA9-41F7-0AA541198A36}"/>
-              </a:ext>
-            </a:extLst>
-          </p:cNvPr>
-          <p:cNvSpPr>
-            <a:spLocks noGrp="1"/>
-          </p:cNvSpPr>
-          <p:nvPr>
-            <p:ph type="ftr" sz="quarter" idx="11"/>
-          </p:nvPr>
-        </p:nvSpPr>
-        <p:spPr/>
-        <p:txBody>
-          <a:bodyPr/>
-          <a:lstStyle/>
-          <a:p>
-            <a:r>
-              <a:rPr lang="en-GB"/>
-              <a:t>V 1.0</a:t>
-            </a:r>
-            <a:endParaRPr lang="en-NL"/>
-          </a:p>
-        </p:txBody>
-      </p:sp>
-    </p:spTree>
-    <p:extLst>
-      <p:ext uri="{BB962C8B-B14F-4D97-AF65-F5344CB8AC3E}">
-        <p14:creationId xmlns:p14="http://schemas.microsoft.com/office/powerpoint/2010/main" val="3204729419"/>
-      </p:ext>
-    </p:extLst>
-  </p:cSld>
-  <p:clrMapOvr>
-    <a:masterClrMapping/>
-  </p:clrMapOvr>
-</p:sld>
-</file>
-
-<file path=ppt/slides/slide37.xml><?xml version="1.0" encoding="utf-8"?>
-<p:sld xmlns:a="http://schemas.openxmlformats.org/drawingml/2006/main" xmlns:r="http://schemas.openxmlformats.org/officeDocument/2006/relationships" xmlns:p="http://schemas.openxmlformats.org/presentationml/2006/main">
-  <p:cSld>
-    <p:spTree>
-      <p:nvGrpSpPr>
-        <p:cNvPr id="1" name=""/>
-        <p:cNvGrpSpPr/>
-        <p:nvPr/>
-      </p:nvGrpSpPr>
-      <p:grpSpPr>
-        <a:xfrm>
-          <a:off x="0" y="0"/>
-          <a:ext cx="0" cy="0"/>
-          <a:chOff x="0" y="0"/>
-          <a:chExt cx="0" cy="0"/>
-        </a:xfrm>
-      </p:grpSpPr>
-      <p:sp>
-        <p:nvSpPr>
-          <p:cNvPr id="3" name="Tijdelijke aanduiding voor tekst 2">
-            <a:extLst>
-              <a:ext uri="{FF2B5EF4-FFF2-40B4-BE49-F238E27FC236}">
-                <a16:creationId xmlns:a16="http://schemas.microsoft.com/office/drawing/2014/main" id="{27F561E4-9754-0C87-65B7-7D2FE3CB145C}"/>
-              </a:ext>
-            </a:extLst>
-          </p:cNvPr>
-          <p:cNvSpPr>
-            <a:spLocks noGrp="1"/>
-          </p:cNvSpPr>
-          <p:nvPr>
-            <p:ph type="body" sz="quarter" idx="12"/>
-          </p:nvPr>
-        </p:nvSpPr>
-        <p:spPr/>
-        <p:txBody>
-          <a:bodyPr/>
-          <a:lstStyle/>
-          <a:p>
-            <a:r>
-              <a:rPr lang="en-NL" sz="6000">
-                <a:latin typeface="American Captain" pitchFamily="2" charset="77"/>
-              </a:rPr>
-              <a:t>Driven by empiricism</a:t>
-            </a:r>
-            <a:endParaRPr lang="nl-NL" dirty="0"/>
-          </a:p>
-        </p:txBody>
-      </p:sp>
-    </p:spTree>
-    <p:extLst>
-      <p:ext uri="{BB962C8B-B14F-4D97-AF65-F5344CB8AC3E}">
-        <p14:creationId xmlns:p14="http://schemas.microsoft.com/office/powerpoint/2010/main" val="1160466600"/>
-      </p:ext>
-    </p:extLst>
-  </p:cSld>
-  <p:clrMapOvr>
-    <a:masterClrMapping/>
-  </p:clrMapOvr>
-</p:sld>
-</file>
-
-<file path=ppt/slides/slide38.xml><?xml version="1.0" encoding="utf-8"?>
-<p:sld xmlns:a="http://schemas.openxmlformats.org/drawingml/2006/main" xmlns:r="http://schemas.openxmlformats.org/officeDocument/2006/relationships" xmlns:p="http://schemas.openxmlformats.org/presentationml/2006/main">
-  <p:cSld>
-    <p:spTree>
-      <p:nvGrpSpPr>
-        <p:cNvPr id="1" name=""/>
-        <p:cNvGrpSpPr/>
-        <p:nvPr/>
-      </p:nvGrpSpPr>
-      <p:grpSpPr>
-        <a:xfrm>
-          <a:off x="0" y="0"/>
-          <a:ext cx="0" cy="0"/>
-          <a:chOff x="0" y="0"/>
-          <a:chExt cx="0" cy="0"/>
-        </a:xfrm>
-      </p:grpSpPr>
-      <p:sp>
-        <p:nvSpPr>
-          <p:cNvPr id="2" name="Tijdelijke aanduiding voor voettekst 1">
-            <a:extLst>
-              <a:ext uri="{FF2B5EF4-FFF2-40B4-BE49-F238E27FC236}">
-                <a16:creationId xmlns:a16="http://schemas.microsoft.com/office/drawing/2014/main" id="{E1B86FFD-6927-8AA9-41F7-0AA541198A36}"/>
-              </a:ext>
-            </a:extLst>
-          </p:cNvPr>
-          <p:cNvSpPr>
-            <a:spLocks noGrp="1"/>
-          </p:cNvSpPr>
-          <p:nvPr>
-            <p:ph type="ftr" sz="quarter" idx="11"/>
-          </p:nvPr>
-        </p:nvSpPr>
-        <p:spPr/>
-        <p:txBody>
-          <a:bodyPr/>
-          <a:lstStyle/>
-          <a:p>
-            <a:r>
-              <a:rPr lang="en-GB"/>
-              <a:t>V 1.0</a:t>
-            </a:r>
-            <a:endParaRPr lang="en-NL"/>
-          </a:p>
-        </p:txBody>
-      </p:sp>
-    </p:spTree>
-    <p:extLst>
-      <p:ext uri="{BB962C8B-B14F-4D97-AF65-F5344CB8AC3E}">
-        <p14:creationId xmlns:p14="http://schemas.microsoft.com/office/powerpoint/2010/main" val="3533151899"/>
-      </p:ext>
-    </p:extLst>
-  </p:cSld>
-  <p:clrMapOvr>
-    <a:masterClrMapping/>
-  </p:clrMapOvr>
-</p:sld>
-</file>
-
-<file path=ppt/slides/slide4.xml><?xml version="1.0" encoding="utf-8"?>
+<file path=ppt/slides/slide8.xml><?xml version="1.0" encoding="utf-8"?>
 <p:sld xmlns:a="http://schemas.openxmlformats.org/drawingml/2006/main" xmlns:r="http://schemas.openxmlformats.org/officeDocument/2006/relationships" xmlns:p="http://schemas.openxmlformats.org/presentationml/2006/main">
   <p:cSld>
     <p:spTree>
@@ -17325,7 +19049,7 @@
           <a:p>
             <a:r>
               <a:rPr lang="en-GB"/>
-              <a:t>V 1.0</a:t>
+              <a:t>1.1</a:t>
             </a:r>
             <a:endParaRPr lang="en-NL"/>
           </a:p>
@@ -17344,7 +19068,7 @@
 </p:sld>
 </file>
 
-<file path=ppt/slides/slide5.xml><?xml version="1.0" encoding="utf-8"?>
+<file path=ppt/slides/slide9.xml><?xml version="1.0" encoding="utf-8"?>
 <p:sld xmlns:a="http://schemas.openxmlformats.org/drawingml/2006/main" xmlns:r="http://schemas.openxmlformats.org/officeDocument/2006/relationships" xmlns:p="http://schemas.openxmlformats.org/presentationml/2006/main">
   <p:cSld>
     <p:spTree>
@@ -17393,241 +19117,6 @@
     <p:extLst>
       <p:ext uri="{BB962C8B-B14F-4D97-AF65-F5344CB8AC3E}">
         <p14:creationId xmlns:p14="http://schemas.microsoft.com/office/powerpoint/2010/main" val="1254501423"/>
-      </p:ext>
-    </p:extLst>
-  </p:cSld>
-  <p:clrMapOvr>
-    <a:masterClrMapping/>
-  </p:clrMapOvr>
-</p:sld>
-</file>
-
-<file path=ppt/slides/slide6.xml><?xml version="1.0" encoding="utf-8"?>
-<p:sld xmlns:a="http://schemas.openxmlformats.org/drawingml/2006/main" xmlns:r="http://schemas.openxmlformats.org/officeDocument/2006/relationships" xmlns:p="http://schemas.openxmlformats.org/presentationml/2006/main">
-  <p:cSld>
-    <p:spTree>
-      <p:nvGrpSpPr>
-        <p:cNvPr id="1" name=""/>
-        <p:cNvGrpSpPr/>
-        <p:nvPr/>
-      </p:nvGrpSpPr>
-      <p:grpSpPr>
-        <a:xfrm>
-          <a:off x="0" y="0"/>
-          <a:ext cx="0" cy="0"/>
-          <a:chOff x="0" y="0"/>
-          <a:chExt cx="0" cy="0"/>
-        </a:xfrm>
-      </p:grpSpPr>
-      <p:sp>
-        <p:nvSpPr>
-          <p:cNvPr id="2" name="Tijdelijke aanduiding voor voettekst 1">
-            <a:extLst>
-              <a:ext uri="{FF2B5EF4-FFF2-40B4-BE49-F238E27FC236}">
-                <a16:creationId xmlns:a16="http://schemas.microsoft.com/office/drawing/2014/main" id="{4B9B72EC-C051-29B0-F054-01E34038788F}"/>
-              </a:ext>
-            </a:extLst>
-          </p:cNvPr>
-          <p:cNvSpPr>
-            <a:spLocks noGrp="1"/>
-          </p:cNvSpPr>
-          <p:nvPr>
-            <p:ph type="ftr" sz="quarter" idx="11"/>
-          </p:nvPr>
-        </p:nvSpPr>
-        <p:spPr/>
-        <p:txBody>
-          <a:bodyPr/>
-          <a:lstStyle/>
-          <a:p>
-            <a:r>
-              <a:rPr lang="en-GB"/>
-              <a:t>V 1.0</a:t>
-            </a:r>
-            <a:endParaRPr lang="en-NL"/>
-          </a:p>
-        </p:txBody>
-      </p:sp>
-    </p:spTree>
-    <p:extLst>
-      <p:ext uri="{BB962C8B-B14F-4D97-AF65-F5344CB8AC3E}">
-        <p14:creationId xmlns:p14="http://schemas.microsoft.com/office/powerpoint/2010/main" val="922097976"/>
-      </p:ext>
-    </p:extLst>
-  </p:cSld>
-  <p:clrMapOvr>
-    <a:masterClrMapping/>
-  </p:clrMapOvr>
-</p:sld>
-</file>
-
-<file path=ppt/slides/slide7.xml><?xml version="1.0" encoding="utf-8"?>
-<p:sld xmlns:a="http://schemas.openxmlformats.org/drawingml/2006/main" xmlns:r="http://schemas.openxmlformats.org/officeDocument/2006/relationships" xmlns:p="http://schemas.openxmlformats.org/presentationml/2006/main">
-  <p:cSld>
-    <p:spTree>
-      <p:nvGrpSpPr>
-        <p:cNvPr id="1" name=""/>
-        <p:cNvGrpSpPr/>
-        <p:nvPr/>
-      </p:nvGrpSpPr>
-      <p:grpSpPr>
-        <a:xfrm>
-          <a:off x="0" y="0"/>
-          <a:ext cx="0" cy="0"/>
-          <a:chOff x="0" y="0"/>
-          <a:chExt cx="0" cy="0"/>
-        </a:xfrm>
-      </p:grpSpPr>
-      <p:sp>
-        <p:nvSpPr>
-          <p:cNvPr id="2" name="Tijdelijke aanduiding voor tekst 1">
-            <a:extLst>
-              <a:ext uri="{FF2B5EF4-FFF2-40B4-BE49-F238E27FC236}">
-                <a16:creationId xmlns:a16="http://schemas.microsoft.com/office/drawing/2014/main" id="{6E35FEE2-51E9-8EFB-B0A5-D1B831A3BB7B}"/>
-              </a:ext>
-            </a:extLst>
-          </p:cNvPr>
-          <p:cNvSpPr>
-            <a:spLocks noGrp="1"/>
-          </p:cNvSpPr>
-          <p:nvPr>
-            <p:ph type="body" sz="quarter" idx="13"/>
-          </p:nvPr>
-        </p:nvSpPr>
-        <p:spPr/>
-        <p:txBody>
-          <a:bodyPr/>
-          <a:lstStyle/>
-          <a:p>
-            <a:r>
-              <a:rPr lang="nl-NL" dirty="0" err="1"/>
-              <a:t>lifecycle</a:t>
-            </a:r>
-            <a:endParaRPr lang="nl-NL" dirty="0"/>
-          </a:p>
-        </p:txBody>
-      </p:sp>
-    </p:spTree>
-    <p:extLst>
-      <p:ext uri="{BB962C8B-B14F-4D97-AF65-F5344CB8AC3E}">
-        <p14:creationId xmlns:p14="http://schemas.microsoft.com/office/powerpoint/2010/main" val="3007727432"/>
-      </p:ext>
-    </p:extLst>
-  </p:cSld>
-  <p:clrMapOvr>
-    <a:masterClrMapping/>
-  </p:clrMapOvr>
-</p:sld>
-</file>
-
-<file path=ppt/slides/slide8.xml><?xml version="1.0" encoding="utf-8"?>
-<p:sld xmlns:a="http://schemas.openxmlformats.org/drawingml/2006/main" xmlns:r="http://schemas.openxmlformats.org/officeDocument/2006/relationships" xmlns:p="http://schemas.openxmlformats.org/presentationml/2006/main">
-  <p:cSld>
-    <p:spTree>
-      <p:nvGrpSpPr>
-        <p:cNvPr id="1" name=""/>
-        <p:cNvGrpSpPr/>
-        <p:nvPr/>
-      </p:nvGrpSpPr>
-      <p:grpSpPr>
-        <a:xfrm>
-          <a:off x="0" y="0"/>
-          <a:ext cx="0" cy="0"/>
-          <a:chOff x="0" y="0"/>
-          <a:chExt cx="0" cy="0"/>
-        </a:xfrm>
-      </p:grpSpPr>
-      <p:sp>
-        <p:nvSpPr>
-          <p:cNvPr id="2" name="Tijdelijke aanduiding voor voettekst 1">
-            <a:extLst>
-              <a:ext uri="{FF2B5EF4-FFF2-40B4-BE49-F238E27FC236}">
-                <a16:creationId xmlns:a16="http://schemas.microsoft.com/office/drawing/2014/main" id="{A58A36B1-0A05-1A7E-4047-D48B016EF266}"/>
-              </a:ext>
-            </a:extLst>
-          </p:cNvPr>
-          <p:cNvSpPr>
-            <a:spLocks noGrp="1"/>
-          </p:cNvSpPr>
-          <p:nvPr>
-            <p:ph type="ftr" sz="quarter" idx="11"/>
-          </p:nvPr>
-        </p:nvSpPr>
-        <p:spPr/>
-        <p:txBody>
-          <a:bodyPr/>
-          <a:lstStyle/>
-          <a:p>
-            <a:r>
-              <a:rPr lang="en-GB"/>
-              <a:t>V 1.0</a:t>
-            </a:r>
-            <a:endParaRPr lang="en-NL"/>
-          </a:p>
-        </p:txBody>
-      </p:sp>
-    </p:spTree>
-    <p:extLst>
-      <p:ext uri="{BB962C8B-B14F-4D97-AF65-F5344CB8AC3E}">
-        <p14:creationId xmlns:p14="http://schemas.microsoft.com/office/powerpoint/2010/main" val="1238703048"/>
-      </p:ext>
-    </p:extLst>
-  </p:cSld>
-  <p:clrMapOvr>
-    <a:masterClrMapping/>
-  </p:clrMapOvr>
-</p:sld>
-</file>
-
-<file path=ppt/slides/slide9.xml><?xml version="1.0" encoding="utf-8"?>
-<p:sld xmlns:a="http://schemas.openxmlformats.org/drawingml/2006/main" xmlns:r="http://schemas.openxmlformats.org/officeDocument/2006/relationships" xmlns:p="http://schemas.openxmlformats.org/presentationml/2006/main">
-  <p:cSld>
-    <p:spTree>
-      <p:nvGrpSpPr>
-        <p:cNvPr id="1" name=""/>
-        <p:cNvGrpSpPr/>
-        <p:nvPr/>
-      </p:nvGrpSpPr>
-      <p:grpSpPr>
-        <a:xfrm>
-          <a:off x="0" y="0"/>
-          <a:ext cx="0" cy="0"/>
-          <a:chOff x="0" y="0"/>
-          <a:chExt cx="0" cy="0"/>
-        </a:xfrm>
-      </p:grpSpPr>
-      <p:sp>
-        <p:nvSpPr>
-          <p:cNvPr id="2" name="Tijdelijke aanduiding voor tekst 1">
-            <a:extLst>
-              <a:ext uri="{FF2B5EF4-FFF2-40B4-BE49-F238E27FC236}">
-                <a16:creationId xmlns:a16="http://schemas.microsoft.com/office/drawing/2014/main" id="{3B9B380A-4BAF-FD23-AE02-AEF54C57516F}"/>
-              </a:ext>
-            </a:extLst>
-          </p:cNvPr>
-          <p:cNvSpPr>
-            <a:spLocks noGrp="1"/>
-          </p:cNvSpPr>
-          <p:nvPr>
-            <p:ph type="body" sz="quarter" idx="13"/>
-          </p:nvPr>
-        </p:nvSpPr>
-        <p:spPr/>
-        <p:txBody>
-          <a:bodyPr/>
-          <a:lstStyle/>
-          <a:p>
-            <a:r>
-              <a:rPr lang="nl-NL" dirty="0"/>
-              <a:t>Risk</a:t>
-            </a:r>
-          </a:p>
-        </p:txBody>
-      </p:sp>
-    </p:spTree>
-    <p:extLst>
-      <p:ext uri="{BB962C8B-B14F-4D97-AF65-F5344CB8AC3E}">
-        <p14:creationId xmlns:p14="http://schemas.microsoft.com/office/powerpoint/2010/main" val="3905389854"/>
       </p:ext>
     </p:extLst>
   </p:cSld>

</xml_diff>